<commit_message>
Updated webpack demo to use .ts from the beginning.
</commit_message>
<xml_diff>
--- a/20170331-microsoft-60min/_notes/Presentation.pptx
+++ b/20170331-microsoft-60min/_notes/Presentation.pptx
@@ -17,9 +17,9 @@
     <p:sldId id="266" r:id="rId5"/>
     <p:sldId id="260" r:id="rId6"/>
     <p:sldId id="259" r:id="rId7"/>
-    <p:sldId id="272" r:id="rId8"/>
-    <p:sldId id="277" r:id="rId9"/>
-    <p:sldId id="278" r:id="rId10"/>
+    <p:sldId id="277" r:id="rId8"/>
+    <p:sldId id="278" r:id="rId9"/>
+    <p:sldId id="272" r:id="rId10"/>
     <p:sldId id="268" r:id="rId11"/>
     <p:sldId id="263" r:id="rId12"/>
     <p:sldId id="275" r:id="rId13"/>
@@ -2243,7 +2243,7 @@
           <a:graphicData uri="http://schemas.openxmlformats.org/presentationml/2006/ole">
             <mc:AlternateContent xmlns:mc="http://schemas.openxmlformats.org/markup-compatibility/2006">
               <mc:Choice xmlns:v="urn:schemas-microsoft-com:vml" Requires="v">
-                <p:oleObj spid="_x0000_s1416" name="think-cell Slide" r:id="rId11" imgW="473" imgH="473" progId="TCLayout.ActiveDocument.1">
+                <p:oleObj spid="_x0000_s1426" name="think-cell Slide" r:id="rId11" imgW="473" imgH="473" progId="TCLayout.ActiveDocument.1">
                   <p:embed/>
                 </p:oleObj>
               </mc:Choice>
@@ -5989,7 +5989,7 @@
             <a:pPr lvl="1"/>
             <a:r>
               <a:rPr lang="da-DK" dirty="0"/>
-              <a:t>C# + &lt; anything &gt;</a:t>
+              <a:t>C# + [anything]</a:t>
             </a:r>
           </a:p>
           <a:p>
@@ -6696,7 +6696,7 @@
           <a:p>
             <a:r>
               <a:rPr lang="da-DK" dirty="0"/>
-              <a:t>Why this talk?</a:t>
+              <a:t>Approach</a:t>
             </a:r>
           </a:p>
         </p:txBody>
@@ -6877,17 +6877,16 @@
         <p:spPr/>
         <p:txBody>
           <a:bodyPr>
-            <a:normAutofit lnSpcReduction="10000"/>
+            <a:normAutofit/>
           </a:bodyPr>
           <a:lstStyle/>
           <a:p>
             <a:r>
               <a:rPr lang="da-DK" dirty="0"/>
-              <a:t>Founded in 2014 (spin-off from SkabelonDesign)</a:t>
-            </a:r>
-          </a:p>
-          <a:p>
-            <a:pPr lvl="1"/>
+              <a:t>Founded in 2014</a:t>
+            </a:r>
+          </a:p>
+          <a:p>
             <a:r>
               <a:rPr lang="da-DK" dirty="0"/>
               <a:t>Approx. 30 employees</a:t>
@@ -6964,13 +6963,6 @@
           <a:p>
             <a:pPr lvl="2"/>
             <a:endParaRPr lang="da-DK" dirty="0"/>
-          </a:p>
-          <a:p>
-            <a:pPr lvl="1"/>
-            <a:r>
-              <a:rPr lang="da-DK" dirty="0"/>
-              <a:t>Tech: .NET, Azure, React, VSTO, git, VSTS, Azure SQL</a:t>
-            </a:r>
           </a:p>
           <a:p>
             <a:pPr lvl="2"/>
@@ -7085,7 +7077,7 @@
           <a:p>
             <a:r>
               <a:rPr lang="da-DK" dirty="0"/>
-              <a:t>Our Rewrite Story</a:t>
+              <a:t>Our Rewrite</a:t>
             </a:r>
           </a:p>
         </p:txBody>
@@ -7279,53 +7271,6 @@
       </p:grpSpPr>
       <p:sp>
         <p:nvSpPr>
-          <p:cNvPr id="76" name="Rectangle 75"/>
-          <p:cNvSpPr/>
-          <p:nvPr/>
-        </p:nvSpPr>
-        <p:spPr>
-          <a:xfrm>
-            <a:off x="2423592" y="1085605"/>
-            <a:ext cx="7344816" cy="3168352"/>
-          </a:xfrm>
-          <a:prstGeom prst="rect">
-            <a:avLst/>
-          </a:prstGeom>
-          <a:ln>
-            <a:prstDash val="sysDash"/>
-          </a:ln>
-        </p:spPr>
-        <p:style>
-          <a:lnRef idx="2">
-            <a:schemeClr val="dk1"/>
-          </a:lnRef>
-          <a:fillRef idx="1">
-            <a:schemeClr val="lt1"/>
-          </a:fillRef>
-          <a:effectRef idx="0">
-            <a:schemeClr val="dk1"/>
-          </a:effectRef>
-          <a:fontRef idx="minor">
-            <a:schemeClr val="dk1"/>
-          </a:fontRef>
-        </p:style>
-        <p:txBody>
-          <a:bodyPr rtlCol="0" anchor="ctr"/>
-          <a:lstStyle/>
-          <a:p>
-            <a:pPr algn="ctr"/>
-            <a:endParaRPr lang="da-DK" sz="900" dirty="0">
-              <a:solidFill>
-                <a:schemeClr val="tx1"/>
-              </a:solidFill>
-              <a:latin typeface="Arial" panose="020B0604020202020204" pitchFamily="34" charset="0"/>
-              <a:cs typeface="Arial" panose="020B0604020202020204" pitchFamily="34" charset="0"/>
-            </a:endParaRPr>
-          </a:p>
-        </p:txBody>
-      </p:sp>
-      <p:sp>
-        <p:nvSpPr>
           <p:cNvPr id="2" name="Title 1"/>
           <p:cNvSpPr>
             <a:spLocks noGrp="1"/>
@@ -7341,7 +7286,7 @@
           <a:p>
             <a:r>
               <a:rPr lang="da-DK" dirty="0"/>
-              <a:t>React Reconcillation</a:t>
+              <a:t>Visual Studio</a:t>
             </a:r>
           </a:p>
         </p:txBody>
@@ -7361,7 +7306,86 @@
           <a:bodyPr/>
           <a:lstStyle/>
           <a:p>
+            <a:endParaRPr lang="da-DK" dirty="0"/>
+          </a:p>
+          <a:p>
+            <a:r>
+              <a:rPr lang="da-DK" dirty="0"/>
+              <a:t>Extensions</a:t>
+            </a:r>
+          </a:p>
+          <a:p>
             <a:pPr lvl="1"/>
+            <a:r>
+              <a:rPr lang="da-DK" dirty="0"/>
+              <a:t>NPM / Webpack Task Runner</a:t>
+            </a:r>
+          </a:p>
+          <a:p>
+            <a:pPr lvl="1"/>
+            <a:r>
+              <a:rPr lang="da-DK" dirty="0"/>
+              <a:t>TypeScript for Visual Studio</a:t>
+            </a:r>
+          </a:p>
+          <a:p>
+            <a:pPr lvl="1"/>
+            <a:endParaRPr lang="da-DK" dirty="0"/>
+          </a:p>
+          <a:p>
+            <a:pPr lvl="1"/>
+            <a:endParaRPr lang="da-DK" dirty="0"/>
+          </a:p>
+          <a:p>
+            <a:r>
+              <a:rPr lang="da-DK" dirty="0"/>
+              <a:t>Our Pains</a:t>
+            </a:r>
+          </a:p>
+          <a:p>
+            <a:pPr lvl="1"/>
+            <a:r>
+              <a:rPr lang="da-DK" dirty="0"/>
+              <a:t>Visual Studio + ReShaper vs JavaScript Ecosystem</a:t>
+            </a:r>
+          </a:p>
+          <a:p>
+            <a:pPr lvl="1"/>
+            <a:r>
+              <a:rPr lang="da-DK" dirty="0"/>
+              <a:t>Visual Studio: TypeScript typings caching</a:t>
+            </a:r>
+          </a:p>
+          <a:p>
+            <a:pPr lvl="1"/>
+            <a:r>
+              <a:rPr lang="da-DK" dirty="0"/>
+              <a:t>TypeScript typings</a:t>
+            </a:r>
+          </a:p>
+          <a:p>
+            <a:pPr lvl="2"/>
+            <a:r>
+              <a:rPr lang="da-DK" dirty="0"/>
+              <a:t>TSD &gt; Typings &gt; npm @types</a:t>
+            </a:r>
+          </a:p>
+          <a:p>
+            <a:pPr lvl="1"/>
+            <a:r>
+              <a:rPr lang="da-DK" dirty="0"/>
+              <a:t>Webpack incremental build time</a:t>
+            </a:r>
+          </a:p>
+          <a:p>
+            <a:pPr lvl="1"/>
+            <a:endParaRPr lang="da-DK" dirty="0"/>
+          </a:p>
+          <a:p>
+            <a:pPr lvl="1"/>
+            <a:endParaRPr lang="da-DK" dirty="0"/>
+          </a:p>
+          <a:p>
             <a:endParaRPr lang="da-DK" dirty="0"/>
           </a:p>
           <a:p>
@@ -7393,865 +7417,171 @@
           </a:p>
         </p:txBody>
       </p:sp>
-      <p:sp>
-        <p:nvSpPr>
-          <p:cNvPr id="5" name="Rectangle 4"/>
-          <p:cNvSpPr/>
+      <p:pic>
+        <p:nvPicPr>
+          <p:cNvPr id="5" name="Picture 11" descr="C:\dev\react-webpack-typescript\_notes\images\visual_studio.png"/>
+          <p:cNvPicPr>
+            <a:picLocks noChangeAspect="1" noChangeArrowheads="1"/>
+          </p:cNvPicPr>
           <p:nvPr/>
-        </p:nvSpPr>
-        <p:spPr>
-          <a:xfrm>
-            <a:off x="3236744" y="1547035"/>
-            <a:ext cx="720000" cy="504056"/>
+        </p:nvPicPr>
+        <p:blipFill>
+          <a:blip r:embed="rId2" cstate="print">
+            <a:extLst>
+              <a:ext uri="{28A0092B-C50C-407E-A947-70E740481C1C}">
+                <a14:useLocalDpi xmlns:a14="http://schemas.microsoft.com/office/drawing/2010/main" val="0"/>
+              </a:ext>
+            </a:extLst>
+          </a:blip>
+          <a:srcRect/>
+          <a:stretch>
+            <a:fillRect/>
+          </a:stretch>
+        </p:blipFill>
+        <p:spPr bwMode="auto">
+          <a:xfrm>
+            <a:off x="6877462" y="990332"/>
+            <a:ext cx="4673191" cy="2320895"/>
           </a:xfrm>
           <a:prstGeom prst="rect">
             <a:avLst/>
           </a:prstGeom>
-          <a:ln/>
-        </p:spPr>
-        <p:style>
-          <a:lnRef idx="2">
-            <a:schemeClr val="accent1">
-              <a:shade val="50000"/>
-            </a:schemeClr>
-          </a:lnRef>
-          <a:fillRef idx="1">
-            <a:schemeClr val="accent1"/>
-          </a:fillRef>
-          <a:effectRef idx="0">
-            <a:schemeClr val="accent1"/>
-          </a:effectRef>
-          <a:fontRef idx="minor">
-            <a:schemeClr val="lt1"/>
-          </a:fontRef>
-        </p:style>
-        <p:txBody>
-          <a:bodyPr rtlCol="0" anchor="ctr"/>
-          <a:lstStyle/>
-          <a:p>
-            <a:pPr algn="ctr"/>
-            <a:r>
-              <a:rPr lang="da-DK" sz="1600" dirty="0">
+          <a:noFill/>
+          <a:extLst>
+            <a:ext uri="{909E8E84-426E-40DD-AFC4-6F175D3DCCD1}">
+              <a14:hiddenFill xmlns:a14="http://schemas.microsoft.com/office/drawing/2010/main">
                 <a:solidFill>
-                  <a:schemeClr val="bg1"/>
+                  <a:srgbClr val="FFFFFF"/>
                 </a:solidFill>
-                <a:latin typeface="Arial" panose="020B0604020202020204" pitchFamily="34" charset="0"/>
-                <a:cs typeface="Arial" panose="020B0604020202020204" pitchFamily="34" charset="0"/>
-              </a:rPr>
-              <a:t>div</a:t>
-            </a:r>
-          </a:p>
-        </p:txBody>
-      </p:sp>
-      <p:sp>
-        <p:nvSpPr>
-          <p:cNvPr id="7" name="Rectangle 6"/>
-          <p:cNvSpPr/>
+              </a14:hiddenFill>
+            </a:ext>
+          </a:extLst>
+        </p:spPr>
+      </p:pic>
+      <p:pic>
+        <p:nvPicPr>
+          <p:cNvPr id="6" name="Picture 5"/>
+          <p:cNvPicPr>
+            <a:picLocks noChangeAspect="1"/>
+          </p:cNvPicPr>
           <p:nvPr/>
-        </p:nvSpPr>
-        <p:spPr>
-          <a:xfrm>
-            <a:off x="2860376" y="2503743"/>
-            <a:ext cx="720000" cy="504056"/>
+        </p:nvPicPr>
+        <p:blipFill>
+          <a:blip r:embed="rId3" cstate="print">
+            <a:extLst>
+              <a:ext uri="{28A0092B-C50C-407E-A947-70E740481C1C}">
+                <a14:useLocalDpi xmlns:a14="http://schemas.microsoft.com/office/drawing/2010/main" val="0"/>
+              </a:ext>
+            </a:extLst>
+          </a:blip>
+          <a:stretch>
+            <a:fillRect/>
+          </a:stretch>
+        </p:blipFill>
+        <p:spPr>
+          <a:xfrm>
+            <a:off x="7806497" y="3954377"/>
+            <a:ext cx="908789" cy="1070866"/>
           </a:xfrm>
           <a:prstGeom prst="rect">
             <a:avLst/>
           </a:prstGeom>
-          <a:ln/>
-        </p:spPr>
-        <p:style>
-          <a:lnRef idx="2">
-            <a:schemeClr val="accent1">
-              <a:shade val="50000"/>
-            </a:schemeClr>
-          </a:lnRef>
-          <a:fillRef idx="1">
-            <a:schemeClr val="accent1"/>
-          </a:fillRef>
-          <a:effectRef idx="0">
-            <a:schemeClr val="accent1"/>
-          </a:effectRef>
-          <a:fontRef idx="minor">
-            <a:schemeClr val="lt1"/>
-          </a:fontRef>
-        </p:style>
-        <p:txBody>
-          <a:bodyPr rtlCol="0" anchor="ctr"/>
-          <a:lstStyle/>
-          <a:p>
-            <a:pPr algn="ctr"/>
-            <a:r>
-              <a:rPr lang="da-DK" sz="1600" dirty="0">
-                <a:solidFill>
-                  <a:schemeClr val="bg1"/>
-                </a:solidFill>
-                <a:latin typeface="Arial" panose="020B0604020202020204" pitchFamily="34" charset="0"/>
-                <a:cs typeface="Arial" panose="020B0604020202020204" pitchFamily="34" charset="0"/>
-              </a:rPr>
-              <a:t>h1</a:t>
-            </a:r>
-          </a:p>
-        </p:txBody>
-      </p:sp>
-      <p:sp>
-        <p:nvSpPr>
-          <p:cNvPr id="8" name="Rectangle 7"/>
-          <p:cNvSpPr/>
+        </p:spPr>
+      </p:pic>
+      <p:pic>
+        <p:nvPicPr>
+          <p:cNvPr id="7" name="Picture 9" descr="C:\dev\react-webpack-typescript\_notes\images\webpack.jpg"/>
+          <p:cNvPicPr>
+            <a:picLocks noChangeAspect="1" noChangeArrowheads="1"/>
+          </p:cNvPicPr>
           <p:nvPr/>
-        </p:nvSpPr>
-        <p:spPr>
-          <a:xfrm>
-            <a:off x="3699777" y="2503743"/>
-            <a:ext cx="720000" cy="504056"/>
+        </p:nvPicPr>
+        <p:blipFill>
+          <a:blip r:embed="rId4" cstate="print">
+            <a:extLst>
+              <a:ext uri="{28A0092B-C50C-407E-A947-70E740481C1C}">
+                <a14:useLocalDpi xmlns:a14="http://schemas.microsoft.com/office/drawing/2010/main" val="0"/>
+              </a:ext>
+            </a:extLst>
+          </a:blip>
+          <a:srcRect/>
+          <a:stretch>
+            <a:fillRect/>
+          </a:stretch>
+        </p:blipFill>
+        <p:spPr bwMode="auto">
+          <a:xfrm>
+            <a:off x="8832304" y="4878021"/>
+            <a:ext cx="1357755" cy="940245"/>
           </a:xfrm>
           <a:prstGeom prst="rect">
             <a:avLst/>
           </a:prstGeom>
-          <a:ln/>
-        </p:spPr>
-        <p:style>
-          <a:lnRef idx="2">
-            <a:schemeClr val="accent1">
-              <a:shade val="50000"/>
-            </a:schemeClr>
-          </a:lnRef>
-          <a:fillRef idx="1">
-            <a:schemeClr val="accent1"/>
-          </a:fillRef>
-          <a:effectRef idx="0">
-            <a:schemeClr val="accent1"/>
-          </a:effectRef>
-          <a:fontRef idx="minor">
-            <a:schemeClr val="lt1"/>
-          </a:fontRef>
-        </p:style>
-        <p:txBody>
-          <a:bodyPr rtlCol="0" anchor="ctr"/>
-          <a:lstStyle/>
-          <a:p>
-            <a:pPr algn="ctr"/>
-            <a:r>
-              <a:rPr lang="da-DK" sz="1600" dirty="0">
+          <a:noFill/>
+          <a:extLst>
+            <a:ext uri="{909E8E84-426E-40DD-AFC4-6F175D3DCCD1}">
+              <a14:hiddenFill xmlns:a14="http://schemas.microsoft.com/office/drawing/2010/main">
                 <a:solidFill>
-                  <a:schemeClr val="bg1"/>
+                  <a:srgbClr val="FFFFFF"/>
                 </a:solidFill>
-                <a:latin typeface="Arial" panose="020B0604020202020204" pitchFamily="34" charset="0"/>
-                <a:cs typeface="Arial" panose="020B0604020202020204" pitchFamily="34" charset="0"/>
-              </a:rPr>
-              <a:t>ul</a:t>
-            </a:r>
-          </a:p>
-        </p:txBody>
-      </p:sp>
-      <p:sp>
-        <p:nvSpPr>
-          <p:cNvPr id="9" name="Rectangle 8"/>
-          <p:cNvSpPr/>
+              </a14:hiddenFill>
+            </a:ext>
+          </a:extLst>
+        </p:spPr>
+      </p:pic>
+      <p:pic>
+        <p:nvPicPr>
+          <p:cNvPr id="8" name="Picture 10" descr="C:\dev\react-webpack-typescript\_notes\images\typescript.png"/>
+          <p:cNvPicPr>
+            <a:picLocks noChangeAspect="1" noChangeArrowheads="1"/>
+          </p:cNvPicPr>
           <p:nvPr/>
-        </p:nvSpPr>
-        <p:spPr>
-          <a:xfrm>
-            <a:off x="3339777" y="3468232"/>
-            <a:ext cx="720000" cy="504056"/>
+        </p:nvPicPr>
+        <p:blipFill>
+          <a:blip r:embed="rId5" cstate="print">
+            <a:extLst>
+              <a:ext uri="{28A0092B-C50C-407E-A947-70E740481C1C}">
+                <a14:useLocalDpi xmlns:a14="http://schemas.microsoft.com/office/drawing/2010/main" val="0"/>
+              </a:ext>
+            </a:extLst>
+          </a:blip>
+          <a:srcRect/>
+          <a:stretch>
+            <a:fillRect/>
+          </a:stretch>
+        </p:blipFill>
+        <p:spPr bwMode="auto">
+          <a:xfrm>
+            <a:off x="9960392" y="4065327"/>
+            <a:ext cx="1622008" cy="848966"/>
           </a:xfrm>
           <a:prstGeom prst="rect">
             <a:avLst/>
           </a:prstGeom>
-          <a:ln/>
-        </p:spPr>
-        <p:style>
-          <a:lnRef idx="2">
-            <a:schemeClr val="accent1">
-              <a:shade val="50000"/>
-            </a:schemeClr>
-          </a:lnRef>
-          <a:fillRef idx="1">
-            <a:schemeClr val="accent1"/>
-          </a:fillRef>
-          <a:effectRef idx="0">
-            <a:schemeClr val="accent1"/>
-          </a:effectRef>
-          <a:fontRef idx="minor">
-            <a:schemeClr val="lt1"/>
-          </a:fontRef>
-        </p:style>
-        <p:txBody>
-          <a:bodyPr rtlCol="0" anchor="ctr"/>
-          <a:lstStyle/>
-          <a:p>
-            <a:pPr algn="ctr"/>
-            <a:r>
-              <a:rPr lang="da-DK" sz="1600" dirty="0">
+          <a:noFill/>
+          <a:extLst>
+            <a:ext uri="{909E8E84-426E-40DD-AFC4-6F175D3DCCD1}">
+              <a14:hiddenFill xmlns:a14="http://schemas.microsoft.com/office/drawing/2010/main">
                 <a:solidFill>
-                  <a:schemeClr val="bg1"/>
+                  <a:srgbClr val="FFFFFF"/>
                 </a:solidFill>
-                <a:latin typeface="Arial" panose="020B0604020202020204" pitchFamily="34" charset="0"/>
-                <a:cs typeface="Arial" panose="020B0604020202020204" pitchFamily="34" charset="0"/>
-              </a:rPr>
-              <a:t>li</a:t>
-            </a:r>
-          </a:p>
-        </p:txBody>
-      </p:sp>
-      <p:sp>
-        <p:nvSpPr>
-          <p:cNvPr id="10" name="Rectangle 9"/>
+              </a14:hiddenFill>
+            </a:ext>
+          </a:extLst>
+        </p:spPr>
+      </p:pic>
+      <p:sp>
+        <p:nvSpPr>
+          <p:cNvPr id="9" name="Plus Sign 8"/>
           <p:cNvSpPr/>
           <p:nvPr/>
         </p:nvSpPr>
         <p:spPr>
           <a:xfrm>
-            <a:off x="4162810" y="3469944"/>
-            <a:ext cx="720000" cy="504056"/>
-          </a:xfrm>
-          <a:prstGeom prst="rect">
-            <a:avLst/>
-          </a:prstGeom>
-          <a:ln/>
-        </p:spPr>
-        <p:style>
-          <a:lnRef idx="2">
-            <a:schemeClr val="accent1">
-              <a:shade val="50000"/>
-            </a:schemeClr>
-          </a:lnRef>
-          <a:fillRef idx="1">
-            <a:schemeClr val="accent1"/>
-          </a:fillRef>
-          <a:effectRef idx="0">
-            <a:schemeClr val="accent1"/>
-          </a:effectRef>
-          <a:fontRef idx="minor">
-            <a:schemeClr val="lt1"/>
-          </a:fontRef>
-        </p:style>
-        <p:txBody>
-          <a:bodyPr rtlCol="0" anchor="ctr"/>
-          <a:lstStyle/>
-          <a:p>
-            <a:pPr algn="ctr"/>
-            <a:r>
-              <a:rPr lang="da-DK" sz="1600" dirty="0">
-                <a:solidFill>
-                  <a:schemeClr val="bg1"/>
-                </a:solidFill>
-                <a:latin typeface="Arial" panose="020B0604020202020204" pitchFamily="34" charset="0"/>
-                <a:cs typeface="Arial" panose="020B0604020202020204" pitchFamily="34" charset="0"/>
-              </a:rPr>
-              <a:t>li</a:t>
-            </a:r>
-          </a:p>
-        </p:txBody>
-      </p:sp>
-      <p:cxnSp>
-        <p:nvCxnSpPr>
-          <p:cNvPr id="12" name="Straight Connector 11"/>
-          <p:cNvCxnSpPr>
-            <a:stCxn id="5" idx="2"/>
-            <a:endCxn id="7" idx="0"/>
-          </p:cNvCxnSpPr>
-          <p:nvPr/>
-        </p:nvCxnSpPr>
-        <p:spPr>
-          <a:xfrm flipH="1">
-            <a:off x="3220376" y="2051091"/>
-            <a:ext cx="376368" cy="452652"/>
-          </a:xfrm>
-          <a:prstGeom prst="line">
-            <a:avLst/>
-          </a:prstGeom>
-        </p:spPr>
-        <p:style>
-          <a:lnRef idx="1">
-            <a:schemeClr val="accent1"/>
-          </a:lnRef>
-          <a:fillRef idx="0">
-            <a:schemeClr val="accent1"/>
-          </a:fillRef>
-          <a:effectRef idx="0">
-            <a:schemeClr val="accent1"/>
-          </a:effectRef>
-          <a:fontRef idx="minor">
-            <a:schemeClr val="tx1"/>
-          </a:fontRef>
-        </p:style>
-      </p:cxnSp>
-      <p:cxnSp>
-        <p:nvCxnSpPr>
-          <p:cNvPr id="17" name="Straight Connector 16"/>
-          <p:cNvCxnSpPr>
-            <a:stCxn id="5" idx="2"/>
-            <a:endCxn id="8" idx="0"/>
-          </p:cNvCxnSpPr>
-          <p:nvPr/>
-        </p:nvCxnSpPr>
-        <p:spPr>
-          <a:xfrm>
-            <a:off x="3596744" y="2051091"/>
-            <a:ext cx="463033" cy="452652"/>
-          </a:xfrm>
-          <a:prstGeom prst="line">
-            <a:avLst/>
-          </a:prstGeom>
-        </p:spPr>
-        <p:style>
-          <a:lnRef idx="1">
-            <a:schemeClr val="accent1"/>
-          </a:lnRef>
-          <a:fillRef idx="0">
-            <a:schemeClr val="accent1"/>
-          </a:fillRef>
-          <a:effectRef idx="0">
-            <a:schemeClr val="accent1"/>
-          </a:effectRef>
-          <a:fontRef idx="minor">
-            <a:schemeClr val="tx1"/>
-          </a:fontRef>
-        </p:style>
-      </p:cxnSp>
-      <p:cxnSp>
-        <p:nvCxnSpPr>
-          <p:cNvPr id="19" name="Straight Connector 18"/>
-          <p:cNvCxnSpPr>
-            <a:stCxn id="8" idx="2"/>
-            <a:endCxn id="9" idx="0"/>
-          </p:cNvCxnSpPr>
-          <p:nvPr/>
-        </p:nvCxnSpPr>
-        <p:spPr>
-          <a:xfrm flipH="1">
-            <a:off x="3699777" y="3007799"/>
-            <a:ext cx="360000" cy="460433"/>
-          </a:xfrm>
-          <a:prstGeom prst="line">
-            <a:avLst/>
-          </a:prstGeom>
-        </p:spPr>
-        <p:style>
-          <a:lnRef idx="1">
-            <a:schemeClr val="accent1"/>
-          </a:lnRef>
-          <a:fillRef idx="0">
-            <a:schemeClr val="accent1"/>
-          </a:fillRef>
-          <a:effectRef idx="0">
-            <a:schemeClr val="accent1"/>
-          </a:effectRef>
-          <a:fontRef idx="minor">
-            <a:schemeClr val="tx1"/>
-          </a:fontRef>
-        </p:style>
-      </p:cxnSp>
-      <p:cxnSp>
-        <p:nvCxnSpPr>
-          <p:cNvPr id="21" name="Straight Connector 20"/>
-          <p:cNvCxnSpPr>
-            <a:stCxn id="8" idx="2"/>
-            <a:endCxn id="10" idx="0"/>
-          </p:cNvCxnSpPr>
-          <p:nvPr/>
-        </p:nvCxnSpPr>
-        <p:spPr>
-          <a:xfrm>
-            <a:off x="4059777" y="3007799"/>
-            <a:ext cx="463033" cy="462145"/>
-          </a:xfrm>
-          <a:prstGeom prst="line">
-            <a:avLst/>
-          </a:prstGeom>
-        </p:spPr>
-        <p:style>
-          <a:lnRef idx="1">
-            <a:schemeClr val="accent1"/>
-          </a:lnRef>
-          <a:fillRef idx="0">
-            <a:schemeClr val="accent1"/>
-          </a:fillRef>
-          <a:effectRef idx="0">
-            <a:schemeClr val="accent1"/>
-          </a:effectRef>
-          <a:fontRef idx="minor">
-            <a:schemeClr val="tx1"/>
-          </a:fontRef>
-        </p:style>
-      </p:cxnSp>
-      <p:sp>
-        <p:nvSpPr>
-          <p:cNvPr id="57" name="Rectangle 56"/>
-          <p:cNvSpPr/>
-          <p:nvPr/>
-        </p:nvSpPr>
-        <p:spPr>
-          <a:xfrm>
-            <a:off x="7231939" y="1547035"/>
-            <a:ext cx="720000" cy="504056"/>
-          </a:xfrm>
-          <a:prstGeom prst="rect">
-            <a:avLst/>
-          </a:prstGeom>
-          <a:ln/>
-        </p:spPr>
-        <p:style>
-          <a:lnRef idx="2">
-            <a:schemeClr val="accent1">
-              <a:shade val="50000"/>
-            </a:schemeClr>
-          </a:lnRef>
-          <a:fillRef idx="1">
-            <a:schemeClr val="accent1"/>
-          </a:fillRef>
-          <a:effectRef idx="0">
-            <a:schemeClr val="accent1"/>
-          </a:effectRef>
-          <a:fontRef idx="minor">
-            <a:schemeClr val="lt1"/>
-          </a:fontRef>
-        </p:style>
-        <p:txBody>
-          <a:bodyPr rtlCol="0" anchor="ctr"/>
-          <a:lstStyle/>
-          <a:p>
-            <a:pPr algn="ctr"/>
-            <a:r>
-              <a:rPr lang="da-DK" sz="1600" dirty="0">
-                <a:solidFill>
-                  <a:schemeClr val="bg1"/>
-                </a:solidFill>
-                <a:latin typeface="Arial" panose="020B0604020202020204" pitchFamily="34" charset="0"/>
-                <a:cs typeface="Arial" panose="020B0604020202020204" pitchFamily="34" charset="0"/>
-              </a:rPr>
-              <a:t>div</a:t>
-            </a:r>
-          </a:p>
-        </p:txBody>
-      </p:sp>
-      <p:sp>
-        <p:nvSpPr>
-          <p:cNvPr id="58" name="Rectangle 57"/>
-          <p:cNvSpPr/>
-          <p:nvPr/>
-        </p:nvSpPr>
-        <p:spPr>
-          <a:xfrm>
-            <a:off x="6855571" y="2503743"/>
-            <a:ext cx="720000" cy="504056"/>
-          </a:xfrm>
-          <a:prstGeom prst="rect">
-            <a:avLst/>
-          </a:prstGeom>
-          <a:ln/>
-        </p:spPr>
-        <p:style>
-          <a:lnRef idx="2">
-            <a:schemeClr val="accent1">
-              <a:shade val="50000"/>
-            </a:schemeClr>
-          </a:lnRef>
-          <a:fillRef idx="1">
-            <a:schemeClr val="accent1"/>
-          </a:fillRef>
-          <a:effectRef idx="0">
-            <a:schemeClr val="accent1"/>
-          </a:effectRef>
-          <a:fontRef idx="minor">
-            <a:schemeClr val="lt1"/>
-          </a:fontRef>
-        </p:style>
-        <p:txBody>
-          <a:bodyPr rtlCol="0" anchor="ctr"/>
-          <a:lstStyle/>
-          <a:p>
-            <a:pPr algn="ctr"/>
-            <a:r>
-              <a:rPr lang="da-DK" sz="1600" dirty="0">
-                <a:solidFill>
-                  <a:schemeClr val="bg1"/>
-                </a:solidFill>
-                <a:latin typeface="Arial" panose="020B0604020202020204" pitchFamily="34" charset="0"/>
-                <a:cs typeface="Arial" panose="020B0604020202020204" pitchFamily="34" charset="0"/>
-              </a:rPr>
-              <a:t>h1</a:t>
-            </a:r>
-          </a:p>
-        </p:txBody>
-      </p:sp>
-      <p:sp>
-        <p:nvSpPr>
-          <p:cNvPr id="59" name="Rectangle 58"/>
-          <p:cNvSpPr/>
-          <p:nvPr/>
-        </p:nvSpPr>
-        <p:spPr>
-          <a:xfrm>
-            <a:off x="7694972" y="2503743"/>
-            <a:ext cx="720000" cy="504056"/>
-          </a:xfrm>
-          <a:prstGeom prst="rect">
-            <a:avLst/>
-          </a:prstGeom>
-          <a:ln/>
-        </p:spPr>
-        <p:style>
-          <a:lnRef idx="2">
-            <a:schemeClr val="accent1">
-              <a:shade val="50000"/>
-            </a:schemeClr>
-          </a:lnRef>
-          <a:fillRef idx="1">
-            <a:schemeClr val="accent1"/>
-          </a:fillRef>
-          <a:effectRef idx="0">
-            <a:schemeClr val="accent1"/>
-          </a:effectRef>
-          <a:fontRef idx="minor">
-            <a:schemeClr val="lt1"/>
-          </a:fontRef>
-        </p:style>
-        <p:txBody>
-          <a:bodyPr rtlCol="0" anchor="ctr"/>
-          <a:lstStyle/>
-          <a:p>
-            <a:pPr algn="ctr"/>
-            <a:r>
-              <a:rPr lang="da-DK" sz="1600" dirty="0">
-                <a:solidFill>
-                  <a:schemeClr val="bg1"/>
-                </a:solidFill>
-                <a:latin typeface="Arial" panose="020B0604020202020204" pitchFamily="34" charset="0"/>
-                <a:cs typeface="Arial" panose="020B0604020202020204" pitchFamily="34" charset="0"/>
-              </a:rPr>
-              <a:t>ul</a:t>
-            </a:r>
-          </a:p>
-        </p:txBody>
-      </p:sp>
-      <p:sp>
-        <p:nvSpPr>
-          <p:cNvPr id="60" name="Rectangle 59"/>
-          <p:cNvSpPr/>
-          <p:nvPr/>
-        </p:nvSpPr>
-        <p:spPr>
-          <a:xfrm>
-            <a:off x="7334972" y="3468232"/>
-            <a:ext cx="720000" cy="504056"/>
-          </a:xfrm>
-          <a:prstGeom prst="rect">
-            <a:avLst/>
-          </a:prstGeom>
-          <a:ln/>
-        </p:spPr>
-        <p:style>
-          <a:lnRef idx="2">
-            <a:schemeClr val="accent1">
-              <a:shade val="50000"/>
-            </a:schemeClr>
-          </a:lnRef>
-          <a:fillRef idx="1">
-            <a:schemeClr val="accent1"/>
-          </a:fillRef>
-          <a:effectRef idx="0">
-            <a:schemeClr val="accent1"/>
-          </a:effectRef>
-          <a:fontRef idx="minor">
-            <a:schemeClr val="lt1"/>
-          </a:fontRef>
-        </p:style>
-        <p:txBody>
-          <a:bodyPr rtlCol="0" anchor="ctr"/>
-          <a:lstStyle/>
-          <a:p>
-            <a:pPr algn="ctr"/>
-            <a:r>
-              <a:rPr lang="da-DK" sz="1600" dirty="0">
-                <a:solidFill>
-                  <a:schemeClr val="bg1"/>
-                </a:solidFill>
-                <a:latin typeface="Arial" panose="020B0604020202020204" pitchFamily="34" charset="0"/>
-                <a:cs typeface="Arial" panose="020B0604020202020204" pitchFamily="34" charset="0"/>
-              </a:rPr>
-              <a:t>li</a:t>
-            </a:r>
-          </a:p>
-        </p:txBody>
-      </p:sp>
-      <p:sp>
-        <p:nvSpPr>
-          <p:cNvPr id="61" name="Rectangle 60"/>
-          <p:cNvSpPr/>
-          <p:nvPr/>
-        </p:nvSpPr>
-        <p:spPr>
-          <a:xfrm>
-            <a:off x="8158005" y="3469944"/>
-            <a:ext cx="720000" cy="504056"/>
-          </a:xfrm>
-          <a:prstGeom prst="rect">
-            <a:avLst/>
-          </a:prstGeom>
-          <a:ln/>
-        </p:spPr>
-        <p:style>
-          <a:lnRef idx="2">
-            <a:schemeClr val="accent1">
-              <a:shade val="50000"/>
-            </a:schemeClr>
-          </a:lnRef>
-          <a:fillRef idx="1">
-            <a:schemeClr val="accent1"/>
-          </a:fillRef>
-          <a:effectRef idx="0">
-            <a:schemeClr val="accent1"/>
-          </a:effectRef>
-          <a:fontRef idx="minor">
-            <a:schemeClr val="lt1"/>
-          </a:fontRef>
-        </p:style>
-        <p:txBody>
-          <a:bodyPr rtlCol="0" anchor="ctr"/>
-          <a:lstStyle/>
-          <a:p>
-            <a:pPr algn="ctr"/>
-            <a:r>
-              <a:rPr lang="da-DK" sz="1600" dirty="0">
-                <a:solidFill>
-                  <a:schemeClr val="bg1"/>
-                </a:solidFill>
-                <a:latin typeface="Arial" panose="020B0604020202020204" pitchFamily="34" charset="0"/>
-                <a:cs typeface="Arial" panose="020B0604020202020204" pitchFamily="34" charset="0"/>
-              </a:rPr>
-              <a:t>li</a:t>
-            </a:r>
-          </a:p>
-        </p:txBody>
-      </p:sp>
-      <p:cxnSp>
-        <p:nvCxnSpPr>
-          <p:cNvPr id="62" name="Straight Connector 61"/>
-          <p:cNvCxnSpPr>
-            <a:stCxn id="57" idx="2"/>
-            <a:endCxn id="58" idx="0"/>
-          </p:cNvCxnSpPr>
-          <p:nvPr/>
-        </p:nvCxnSpPr>
-        <p:spPr>
-          <a:xfrm flipH="1">
-            <a:off x="7215571" y="2051091"/>
-            <a:ext cx="376368" cy="452652"/>
-          </a:xfrm>
-          <a:prstGeom prst="line">
-            <a:avLst/>
-          </a:prstGeom>
-        </p:spPr>
-        <p:style>
-          <a:lnRef idx="1">
-            <a:schemeClr val="accent1"/>
-          </a:lnRef>
-          <a:fillRef idx="0">
-            <a:schemeClr val="accent1"/>
-          </a:fillRef>
-          <a:effectRef idx="0">
-            <a:schemeClr val="accent1"/>
-          </a:effectRef>
-          <a:fontRef idx="minor">
-            <a:schemeClr val="tx1"/>
-          </a:fontRef>
-        </p:style>
-      </p:cxnSp>
-      <p:cxnSp>
-        <p:nvCxnSpPr>
-          <p:cNvPr id="63" name="Straight Connector 62"/>
-          <p:cNvCxnSpPr>
-            <a:stCxn id="57" idx="2"/>
-            <a:endCxn id="59" idx="0"/>
-          </p:cNvCxnSpPr>
-          <p:nvPr/>
-        </p:nvCxnSpPr>
-        <p:spPr>
-          <a:xfrm>
-            <a:off x="7591939" y="2051091"/>
-            <a:ext cx="463033" cy="452652"/>
-          </a:xfrm>
-          <a:prstGeom prst="line">
-            <a:avLst/>
-          </a:prstGeom>
-        </p:spPr>
-        <p:style>
-          <a:lnRef idx="1">
-            <a:schemeClr val="accent1"/>
-          </a:lnRef>
-          <a:fillRef idx="0">
-            <a:schemeClr val="accent1"/>
-          </a:fillRef>
-          <a:effectRef idx="0">
-            <a:schemeClr val="accent1"/>
-          </a:effectRef>
-          <a:fontRef idx="minor">
-            <a:schemeClr val="tx1"/>
-          </a:fontRef>
-        </p:style>
-      </p:cxnSp>
-      <p:cxnSp>
-        <p:nvCxnSpPr>
-          <p:cNvPr id="64" name="Straight Connector 63"/>
-          <p:cNvCxnSpPr>
-            <a:stCxn id="59" idx="2"/>
-            <a:endCxn id="60" idx="0"/>
-          </p:cNvCxnSpPr>
-          <p:nvPr/>
-        </p:nvCxnSpPr>
-        <p:spPr>
-          <a:xfrm flipH="1">
-            <a:off x="7694972" y="3007799"/>
-            <a:ext cx="360000" cy="460433"/>
-          </a:xfrm>
-          <a:prstGeom prst="line">
-            <a:avLst/>
-          </a:prstGeom>
-        </p:spPr>
-        <p:style>
-          <a:lnRef idx="1">
-            <a:schemeClr val="accent1"/>
-          </a:lnRef>
-          <a:fillRef idx="0">
-            <a:schemeClr val="accent1"/>
-          </a:fillRef>
-          <a:effectRef idx="0">
-            <a:schemeClr val="accent1"/>
-          </a:effectRef>
-          <a:fontRef idx="minor">
-            <a:schemeClr val="tx1"/>
-          </a:fontRef>
-        </p:style>
-      </p:cxnSp>
-      <p:cxnSp>
-        <p:nvCxnSpPr>
-          <p:cNvPr id="65" name="Straight Connector 64"/>
-          <p:cNvCxnSpPr>
-            <a:stCxn id="59" idx="2"/>
-            <a:endCxn id="61" idx="0"/>
-          </p:cNvCxnSpPr>
-          <p:nvPr/>
-        </p:nvCxnSpPr>
-        <p:spPr>
-          <a:xfrm>
-            <a:off x="8054972" y="3007799"/>
-            <a:ext cx="463033" cy="462145"/>
-          </a:xfrm>
-          <a:prstGeom prst="line">
-            <a:avLst/>
-          </a:prstGeom>
-        </p:spPr>
-        <p:style>
-          <a:lnRef idx="1">
-            <a:schemeClr val="accent1"/>
-          </a:lnRef>
-          <a:fillRef idx="0">
-            <a:schemeClr val="accent1"/>
-          </a:fillRef>
-          <a:effectRef idx="0">
-            <a:schemeClr val="accent1"/>
-          </a:effectRef>
-          <a:fontRef idx="minor">
-            <a:schemeClr val="tx1"/>
-          </a:fontRef>
-        </p:style>
-      </p:cxnSp>
-      <p:sp>
-        <p:nvSpPr>
-          <p:cNvPr id="66" name="Rectangle 65"/>
-          <p:cNvSpPr/>
-          <p:nvPr/>
-        </p:nvSpPr>
-        <p:spPr>
-          <a:xfrm>
-            <a:off x="8534373" y="2503743"/>
-            <a:ext cx="720000" cy="504056"/>
-          </a:xfrm>
-          <a:prstGeom prst="rect">
-            <a:avLst/>
-          </a:prstGeom>
-          <a:ln/>
-        </p:spPr>
-        <p:style>
-          <a:lnRef idx="2">
-            <a:schemeClr val="accent3">
-              <a:shade val="50000"/>
-            </a:schemeClr>
-          </a:lnRef>
-          <a:fillRef idx="1">
-            <a:schemeClr val="accent3"/>
-          </a:fillRef>
-          <a:effectRef idx="0">
-            <a:schemeClr val="accent3"/>
-          </a:effectRef>
-          <a:fontRef idx="minor">
-            <a:schemeClr val="lt1"/>
-          </a:fontRef>
-        </p:style>
-        <p:txBody>
-          <a:bodyPr rtlCol="0" anchor="ctr"/>
-          <a:lstStyle/>
-          <a:p>
-            <a:pPr algn="ctr"/>
-            <a:r>
-              <a:rPr lang="da-DK" sz="1600" dirty="0">
-                <a:solidFill>
-                  <a:schemeClr val="bg1"/>
-                </a:solidFill>
-                <a:latin typeface="Arial" panose="020B0604020202020204" pitchFamily="34" charset="0"/>
-                <a:cs typeface="Arial" panose="020B0604020202020204" pitchFamily="34" charset="0"/>
-              </a:rPr>
-              <a:t>p</a:t>
-            </a:r>
-          </a:p>
-        </p:txBody>
-      </p:sp>
-      <p:cxnSp>
-        <p:nvCxnSpPr>
-          <p:cNvPr id="71" name="Straight Connector 70"/>
-          <p:cNvCxnSpPr>
-            <a:stCxn id="57" idx="2"/>
-            <a:endCxn id="66" idx="0"/>
-          </p:cNvCxnSpPr>
-          <p:nvPr/>
-        </p:nvCxnSpPr>
-        <p:spPr>
-          <a:xfrm>
-            <a:off x="7591939" y="2051091"/>
-            <a:ext cx="1302434" cy="452652"/>
-          </a:xfrm>
-          <a:prstGeom prst="line">
-            <a:avLst/>
-          </a:prstGeom>
-        </p:spPr>
-        <p:style>
-          <a:lnRef idx="1">
-            <a:schemeClr val="accent3"/>
-          </a:lnRef>
-          <a:fillRef idx="0">
-            <a:schemeClr val="accent3"/>
-          </a:fillRef>
-          <a:effectRef idx="0">
-            <a:schemeClr val="accent3"/>
-          </a:effectRef>
-          <a:fontRef idx="minor">
-            <a:schemeClr val="tx1"/>
-          </a:fontRef>
-        </p:style>
-      </p:cxnSp>
-      <p:sp>
-        <p:nvSpPr>
-          <p:cNvPr id="75" name="Arrow: Down 74"/>
-          <p:cNvSpPr/>
-          <p:nvPr/>
-        </p:nvSpPr>
-        <p:spPr>
-          <a:xfrm>
-            <a:off x="5657705" y="4192795"/>
-            <a:ext cx="432048" cy="840648"/>
-          </a:xfrm>
-          <a:prstGeom prst="downArrow">
+            <a:off x="9107762" y="3155794"/>
+            <a:ext cx="806838" cy="773093"/>
+          </a:xfrm>
+          <a:prstGeom prst="mathPlus">
             <a:avLst/>
           </a:prstGeom>
           <a:solidFill>
@@ -8295,135 +7625,14 @@
       </p:sp>
       <p:sp>
         <p:nvSpPr>
-          <p:cNvPr id="77" name="Arrow: Left-Right 76"/>
+          <p:cNvPr id="10" name="Rectangle 9"/>
           <p:cNvSpPr/>
           <p:nvPr/>
         </p:nvSpPr>
         <p:spPr>
           <a:xfrm>
-            <a:off x="5297665" y="2503743"/>
-            <a:ext cx="1152128" cy="382062"/>
-          </a:xfrm>
-          <a:prstGeom prst="leftRightArrow">
-            <a:avLst/>
-          </a:prstGeom>
-          <a:solidFill>
-            <a:schemeClr val="tx1"/>
-          </a:solidFill>
-          <a:ln w="9525">
-            <a:noFill/>
-            <a:prstDash val="dash"/>
-          </a:ln>
-        </p:spPr>
-        <p:style>
-          <a:lnRef idx="2">
-            <a:schemeClr val="accent1">
-              <a:shade val="50000"/>
-            </a:schemeClr>
-          </a:lnRef>
-          <a:fillRef idx="1">
-            <a:schemeClr val="accent1"/>
-          </a:fillRef>
-          <a:effectRef idx="0">
-            <a:schemeClr val="accent1"/>
-          </a:effectRef>
-          <a:fontRef idx="minor">
-            <a:schemeClr val="lt1"/>
-          </a:fontRef>
-        </p:style>
-        <p:txBody>
-          <a:bodyPr rtlCol="0" anchor="ctr"/>
-          <a:lstStyle/>
-          <a:p>
-            <a:pPr algn="ctr"/>
-            <a:endParaRPr lang="da-DK" sz="900" dirty="0">
-              <a:solidFill>
-                <a:schemeClr val="tx1"/>
-              </a:solidFill>
-              <a:latin typeface="Arial" panose="020B0604020202020204" pitchFamily="34" charset="0"/>
-              <a:cs typeface="Arial" panose="020B0604020202020204" pitchFamily="34" charset="0"/>
-            </a:endParaRPr>
-          </a:p>
-        </p:txBody>
-      </p:sp>
-      <p:sp>
-        <p:nvSpPr>
-          <p:cNvPr id="78" name="TextBox 77"/>
-          <p:cNvSpPr txBox="1"/>
-          <p:nvPr/>
-        </p:nvSpPr>
-        <p:spPr>
-          <a:xfrm>
-            <a:off x="5530944" y="2228313"/>
-            <a:ext cx="626202" cy="369332"/>
-          </a:xfrm>
-          <a:prstGeom prst="rect">
-            <a:avLst/>
-          </a:prstGeom>
-          <a:noFill/>
-        </p:spPr>
-        <p:txBody>
-          <a:bodyPr wrap="square" lIns="0" tIns="0" rIns="0" bIns="0" rtlCol="0">
-            <a:spAutoFit/>
-          </a:bodyPr>
-          <a:lstStyle/>
-          <a:p>
-            <a:pPr algn="ctr"/>
-            <a:r>
-              <a:rPr lang="da-DK" sz="2400" dirty="0">
-                <a:latin typeface="Arial" panose="020B0604020202020204" pitchFamily="34" charset="0"/>
-                <a:ea typeface="Open Sans" panose="020B0606030504020204" pitchFamily="34" charset="0"/>
-                <a:cs typeface="Arial" panose="020B0604020202020204" pitchFamily="34" charset="0"/>
-              </a:rPr>
-              <a:t>diff</a:t>
-            </a:r>
-          </a:p>
-        </p:txBody>
-      </p:sp>
-      <p:sp>
-        <p:nvSpPr>
-          <p:cNvPr id="79" name="TextBox 78"/>
-          <p:cNvSpPr txBox="1"/>
-          <p:nvPr/>
-        </p:nvSpPr>
-        <p:spPr>
-          <a:xfrm>
-            <a:off x="5888773" y="4325966"/>
-            <a:ext cx="1198280" cy="369332"/>
-          </a:xfrm>
-          <a:prstGeom prst="rect">
-            <a:avLst/>
-          </a:prstGeom>
-          <a:noFill/>
-        </p:spPr>
-        <p:txBody>
-          <a:bodyPr wrap="square" lIns="0" tIns="0" rIns="0" bIns="0" rtlCol="0">
-            <a:spAutoFit/>
-          </a:bodyPr>
-          <a:lstStyle/>
-          <a:p>
-            <a:pPr algn="ctr"/>
-            <a:r>
-              <a:rPr lang="da-DK" sz="2400" dirty="0">
-                <a:latin typeface="Arial" panose="020B0604020202020204" pitchFamily="34" charset="0"/>
-                <a:ea typeface="Open Sans" panose="020B0606030504020204" pitchFamily="34" charset="0"/>
-                <a:cs typeface="Arial" panose="020B0604020202020204" pitchFamily="34" charset="0"/>
-              </a:rPr>
-              <a:t>patch</a:t>
-            </a:r>
-          </a:p>
-        </p:txBody>
-      </p:sp>
-      <p:sp>
-        <p:nvSpPr>
-          <p:cNvPr id="80" name="Rectangle 79"/>
-          <p:cNvSpPr/>
-          <p:nvPr/>
-        </p:nvSpPr>
-        <p:spPr>
-          <a:xfrm>
-            <a:off x="4522810" y="5085184"/>
-            <a:ext cx="2880945" cy="1152128"/>
+            <a:off x="609600" y="6457514"/>
+            <a:ext cx="302400" cy="303814"/>
           </a:xfrm>
           <a:prstGeom prst="rect">
             <a:avLst/>
@@ -8458,14 +7667,14 @@
           <a:p>
             <a:pPr algn="ctr"/>
             <a:r>
-              <a:rPr lang="da-DK" sz="2400" dirty="0">
+              <a:rPr lang="da-DK" sz="1000" dirty="0">
                 <a:solidFill>
                   <a:schemeClr val="bg1"/>
                 </a:solidFill>
                 <a:latin typeface="Arial" panose="020B0604020202020204" pitchFamily="34" charset="0"/>
                 <a:cs typeface="Arial" panose="020B0604020202020204" pitchFamily="34" charset="0"/>
               </a:rPr>
-              <a:t>DOM</a:t>
+              <a:t>D</a:t>
             </a:r>
           </a:p>
         </p:txBody>
@@ -8473,7 +7682,7 @@
     </p:spTree>
     <p:extLst>
       <p:ext uri="{BB962C8B-B14F-4D97-AF65-F5344CB8AC3E}">
-        <p14:creationId xmlns:p14="http://schemas.microsoft.com/office/powerpoint/2010/main" val="2323718161"/>
+        <p14:creationId xmlns:p14="http://schemas.microsoft.com/office/powerpoint/2010/main" val="2998229742"/>
       </p:ext>
     </p:extLst>
   </p:cSld>
@@ -8517,7 +7726,7 @@
           <a:p>
             <a:r>
               <a:rPr lang="da-DK" dirty="0"/>
-              <a:t>Visual Studio</a:t>
+              <a:t>Thank you!</a:t>
             </a:r>
           </a:p>
         </p:txBody>
@@ -8534,86 +7743,118 @@
         </p:nvSpPr>
         <p:spPr/>
         <p:txBody>
-          <a:bodyPr/>
-          <a:lstStyle/>
+          <a:bodyPr>
+            <a:normAutofit/>
+          </a:bodyPr>
+          <a:lstStyle/>
+          <a:p>
+            <a:r>
+              <a:rPr lang="da-DK" dirty="0"/>
+              <a:t>Advice</a:t>
+            </a:r>
+          </a:p>
+          <a:p>
+            <a:pPr lvl="1"/>
+            <a:r>
+              <a:rPr lang="da-DK" dirty="0"/>
+              <a:t>Understand your tools</a:t>
+            </a:r>
+          </a:p>
+          <a:p>
+            <a:pPr lvl="1"/>
+            <a:r>
+              <a:rPr lang="da-DK" dirty="0"/>
+              <a:t>Keep number of dependencies down</a:t>
+            </a:r>
+          </a:p>
+          <a:p>
+            <a:pPr lvl="1"/>
+            <a:r>
+              <a:rPr lang="da-DK" dirty="0"/>
+              <a:t>Investigate stability of dependencies</a:t>
+            </a:r>
+          </a:p>
           <a:p>
             <a:endParaRPr lang="da-DK" dirty="0"/>
           </a:p>
           <a:p>
             <a:r>
               <a:rPr lang="da-DK" dirty="0"/>
-              <a:t>Extensions</a:t>
+              <a:t>Resources</a:t>
             </a:r>
           </a:p>
           <a:p>
             <a:pPr lvl="1"/>
             <a:r>
               <a:rPr lang="da-DK" dirty="0"/>
-              <a:t>NPM / Webpack Task Runner</a:t>
+              <a:t>npm: </a:t>
+            </a:r>
+            <a:r>
+              <a:rPr lang="da-DK" b="1" dirty="0"/>
+              <a:t>create-react-app</a:t>
+            </a:r>
+            <a:r>
+              <a:rPr lang="da-DK" dirty="0"/>
+              <a:t> from Facebook</a:t>
             </a:r>
           </a:p>
           <a:p>
             <a:pPr lvl="1"/>
             <a:r>
               <a:rPr lang="da-DK" dirty="0"/>
-              <a:t>TypeScript for Visual Studio</a:t>
-            </a:r>
+              <a:t>React communication: </a:t>
+            </a:r>
+            <a:r>
+              <a:rPr lang="da-DK" dirty="0">
+                <a:hlinkClick r:id="rId2"/>
+              </a:rPr>
+              <a:t>http://andrewhfarmer.com/component-communication/</a:t>
+            </a:r>
+            <a:endParaRPr lang="da-DK" dirty="0"/>
           </a:p>
           <a:p>
             <a:pPr lvl="1"/>
+            <a:r>
+              <a:rPr lang="da-DK" dirty="0"/>
+              <a:t>React, Webpack and TypeScript documentation sites</a:t>
+            </a:r>
+          </a:p>
+          <a:p>
             <a:endParaRPr lang="da-DK" dirty="0"/>
           </a:p>
           <a:p>
-            <a:pPr lvl="1"/>
+            <a:r>
+              <a:rPr lang="da-DK" dirty="0"/>
+              <a:t>Twitter: @rasmuskl</a:t>
+            </a:r>
+          </a:p>
+          <a:p>
+            <a:r>
+              <a:rPr lang="da-DK" dirty="0"/>
+              <a:t>Blog: </a:t>
+            </a:r>
+            <a:r>
+              <a:rPr lang="da-DK" dirty="0">
+                <a:hlinkClick r:id="rId3"/>
+              </a:rPr>
+              <a:t>http://rasmuskl.dk</a:t>
+            </a:r>
             <a:endParaRPr lang="da-DK" dirty="0"/>
           </a:p>
           <a:p>
+            <a:endParaRPr lang="da-DK" dirty="0"/>
+          </a:p>
+          <a:p>
             <a:r>
               <a:rPr lang="da-DK" dirty="0"/>
-              <a:t>Our Pains</a:t>
-            </a:r>
-          </a:p>
-          <a:p>
-            <a:pPr lvl="1"/>
-            <a:r>
-              <a:rPr lang="da-DK" dirty="0"/>
-              <a:t>Visual Studio + ReShaper vs JavaScript Ecosystem</a:t>
-            </a:r>
-          </a:p>
-          <a:p>
-            <a:pPr lvl="1"/>
-            <a:r>
-              <a:rPr lang="da-DK" dirty="0"/>
-              <a:t>Visual Studio: TypeScript typings caching</a:t>
-            </a:r>
-          </a:p>
-          <a:p>
-            <a:pPr lvl="1"/>
-            <a:r>
-              <a:rPr lang="da-DK" dirty="0"/>
-              <a:t>TypeScript typings</a:t>
-            </a:r>
-          </a:p>
-          <a:p>
-            <a:pPr lvl="2"/>
-            <a:r>
-              <a:rPr lang="da-DK" dirty="0"/>
-              <a:t>TSD &gt; Typings &gt; npm @types</a:t>
-            </a:r>
-          </a:p>
-          <a:p>
-            <a:pPr lvl="1"/>
-            <a:r>
-              <a:rPr lang="da-DK" dirty="0"/>
-              <a:t>Webpack incremental build time</a:t>
-            </a:r>
-          </a:p>
-          <a:p>
-            <a:pPr lvl="1"/>
-            <a:endParaRPr lang="da-DK" dirty="0"/>
-          </a:p>
-          <a:p>
-            <a:pPr lvl="1"/>
+              <a:t>Presentation + Code will be shared at </a:t>
+            </a:r>
+            <a:r>
+              <a:rPr lang="da-DK" dirty="0">
+                <a:hlinkClick r:id="rId4"/>
+              </a:rPr>
+              <a:t>https://github.com/rasmuskl</a:t>
+            </a:r>
             <a:endParaRPr lang="da-DK" dirty="0"/>
           </a:p>
           <a:p>
@@ -8643,478 +7884,6 @@
               <a:rPr lang="en-US" smtClean="0"/>
               <a:pPr/>
               <a:t>8</a:t>
-            </a:fld>
-            <a:endParaRPr lang="en-US" dirty="0"/>
-          </a:p>
-        </p:txBody>
-      </p:sp>
-      <p:pic>
-        <p:nvPicPr>
-          <p:cNvPr id="5" name="Picture 11" descr="C:\dev\react-webpack-typescript\_notes\images\visual_studio.png"/>
-          <p:cNvPicPr>
-            <a:picLocks noChangeAspect="1" noChangeArrowheads="1"/>
-          </p:cNvPicPr>
-          <p:nvPr/>
-        </p:nvPicPr>
-        <p:blipFill>
-          <a:blip r:embed="rId2" cstate="print">
-            <a:extLst>
-              <a:ext uri="{28A0092B-C50C-407E-A947-70E740481C1C}">
-                <a14:useLocalDpi xmlns:a14="http://schemas.microsoft.com/office/drawing/2010/main" val="0"/>
-              </a:ext>
-            </a:extLst>
-          </a:blip>
-          <a:srcRect/>
-          <a:stretch>
-            <a:fillRect/>
-          </a:stretch>
-        </p:blipFill>
-        <p:spPr bwMode="auto">
-          <a:xfrm>
-            <a:off x="6877462" y="990332"/>
-            <a:ext cx="4673191" cy="2320895"/>
-          </a:xfrm>
-          <a:prstGeom prst="rect">
-            <a:avLst/>
-          </a:prstGeom>
-          <a:noFill/>
-          <a:extLst>
-            <a:ext uri="{909E8E84-426E-40DD-AFC4-6F175D3DCCD1}">
-              <a14:hiddenFill xmlns:a14="http://schemas.microsoft.com/office/drawing/2010/main">
-                <a:solidFill>
-                  <a:srgbClr val="FFFFFF"/>
-                </a:solidFill>
-              </a14:hiddenFill>
-            </a:ext>
-          </a:extLst>
-        </p:spPr>
-      </p:pic>
-      <p:pic>
-        <p:nvPicPr>
-          <p:cNvPr id="6" name="Picture 5"/>
-          <p:cNvPicPr>
-            <a:picLocks noChangeAspect="1"/>
-          </p:cNvPicPr>
-          <p:nvPr/>
-        </p:nvPicPr>
-        <p:blipFill>
-          <a:blip r:embed="rId3" cstate="print">
-            <a:extLst>
-              <a:ext uri="{28A0092B-C50C-407E-A947-70E740481C1C}">
-                <a14:useLocalDpi xmlns:a14="http://schemas.microsoft.com/office/drawing/2010/main" val="0"/>
-              </a:ext>
-            </a:extLst>
-          </a:blip>
-          <a:stretch>
-            <a:fillRect/>
-          </a:stretch>
-        </p:blipFill>
-        <p:spPr>
-          <a:xfrm>
-            <a:off x="7806497" y="3954377"/>
-            <a:ext cx="908789" cy="1070866"/>
-          </a:xfrm>
-          <a:prstGeom prst="rect">
-            <a:avLst/>
-          </a:prstGeom>
-        </p:spPr>
-      </p:pic>
-      <p:pic>
-        <p:nvPicPr>
-          <p:cNvPr id="7" name="Picture 9" descr="C:\dev\react-webpack-typescript\_notes\images\webpack.jpg"/>
-          <p:cNvPicPr>
-            <a:picLocks noChangeAspect="1" noChangeArrowheads="1"/>
-          </p:cNvPicPr>
-          <p:nvPr/>
-        </p:nvPicPr>
-        <p:blipFill>
-          <a:blip r:embed="rId4" cstate="print">
-            <a:extLst>
-              <a:ext uri="{28A0092B-C50C-407E-A947-70E740481C1C}">
-                <a14:useLocalDpi xmlns:a14="http://schemas.microsoft.com/office/drawing/2010/main" val="0"/>
-              </a:ext>
-            </a:extLst>
-          </a:blip>
-          <a:srcRect/>
-          <a:stretch>
-            <a:fillRect/>
-          </a:stretch>
-        </p:blipFill>
-        <p:spPr bwMode="auto">
-          <a:xfrm>
-            <a:off x="8832304" y="4878021"/>
-            <a:ext cx="1357755" cy="940245"/>
-          </a:xfrm>
-          <a:prstGeom prst="rect">
-            <a:avLst/>
-          </a:prstGeom>
-          <a:noFill/>
-          <a:extLst>
-            <a:ext uri="{909E8E84-426E-40DD-AFC4-6F175D3DCCD1}">
-              <a14:hiddenFill xmlns:a14="http://schemas.microsoft.com/office/drawing/2010/main">
-                <a:solidFill>
-                  <a:srgbClr val="FFFFFF"/>
-                </a:solidFill>
-              </a14:hiddenFill>
-            </a:ext>
-          </a:extLst>
-        </p:spPr>
-      </p:pic>
-      <p:pic>
-        <p:nvPicPr>
-          <p:cNvPr id="8" name="Picture 10" descr="C:\dev\react-webpack-typescript\_notes\images\typescript.png"/>
-          <p:cNvPicPr>
-            <a:picLocks noChangeAspect="1" noChangeArrowheads="1"/>
-          </p:cNvPicPr>
-          <p:nvPr/>
-        </p:nvPicPr>
-        <p:blipFill>
-          <a:blip r:embed="rId5" cstate="print">
-            <a:extLst>
-              <a:ext uri="{28A0092B-C50C-407E-A947-70E740481C1C}">
-                <a14:useLocalDpi xmlns:a14="http://schemas.microsoft.com/office/drawing/2010/main" val="0"/>
-              </a:ext>
-            </a:extLst>
-          </a:blip>
-          <a:srcRect/>
-          <a:stretch>
-            <a:fillRect/>
-          </a:stretch>
-        </p:blipFill>
-        <p:spPr bwMode="auto">
-          <a:xfrm>
-            <a:off x="9960392" y="4065327"/>
-            <a:ext cx="1622008" cy="848966"/>
-          </a:xfrm>
-          <a:prstGeom prst="rect">
-            <a:avLst/>
-          </a:prstGeom>
-          <a:noFill/>
-          <a:extLst>
-            <a:ext uri="{909E8E84-426E-40DD-AFC4-6F175D3DCCD1}">
-              <a14:hiddenFill xmlns:a14="http://schemas.microsoft.com/office/drawing/2010/main">
-                <a:solidFill>
-                  <a:srgbClr val="FFFFFF"/>
-                </a:solidFill>
-              </a14:hiddenFill>
-            </a:ext>
-          </a:extLst>
-        </p:spPr>
-      </p:pic>
-      <p:sp>
-        <p:nvSpPr>
-          <p:cNvPr id="9" name="Plus Sign 8"/>
-          <p:cNvSpPr/>
-          <p:nvPr/>
-        </p:nvSpPr>
-        <p:spPr>
-          <a:xfrm>
-            <a:off x="9107762" y="3155794"/>
-            <a:ext cx="806838" cy="773093"/>
-          </a:xfrm>
-          <a:prstGeom prst="mathPlus">
-            <a:avLst/>
-          </a:prstGeom>
-          <a:solidFill>
-            <a:schemeClr val="tx1"/>
-          </a:solidFill>
-          <a:ln w="9525">
-            <a:noFill/>
-            <a:prstDash val="dash"/>
-          </a:ln>
-        </p:spPr>
-        <p:style>
-          <a:lnRef idx="2">
-            <a:schemeClr val="accent1">
-              <a:shade val="50000"/>
-            </a:schemeClr>
-          </a:lnRef>
-          <a:fillRef idx="1">
-            <a:schemeClr val="accent1"/>
-          </a:fillRef>
-          <a:effectRef idx="0">
-            <a:schemeClr val="accent1"/>
-          </a:effectRef>
-          <a:fontRef idx="minor">
-            <a:schemeClr val="lt1"/>
-          </a:fontRef>
-        </p:style>
-        <p:txBody>
-          <a:bodyPr rtlCol="0" anchor="ctr"/>
-          <a:lstStyle/>
-          <a:p>
-            <a:pPr algn="ctr"/>
-            <a:endParaRPr lang="da-DK" sz="900" dirty="0">
-              <a:solidFill>
-                <a:schemeClr val="tx1"/>
-              </a:solidFill>
-              <a:latin typeface="Arial" panose="020B0604020202020204" pitchFamily="34" charset="0"/>
-              <a:cs typeface="Arial" panose="020B0604020202020204" pitchFamily="34" charset="0"/>
-            </a:endParaRPr>
-          </a:p>
-        </p:txBody>
-      </p:sp>
-      <p:sp>
-        <p:nvSpPr>
-          <p:cNvPr id="10" name="Rectangle 9"/>
-          <p:cNvSpPr/>
-          <p:nvPr/>
-        </p:nvSpPr>
-        <p:spPr>
-          <a:xfrm>
-            <a:off x="609600" y="6457514"/>
-            <a:ext cx="302400" cy="303814"/>
-          </a:xfrm>
-          <a:prstGeom prst="rect">
-            <a:avLst/>
-          </a:prstGeom>
-          <a:solidFill>
-            <a:schemeClr val="tx1"/>
-          </a:solidFill>
-          <a:ln w="9525">
-            <a:noFill/>
-            <a:prstDash val="dash"/>
-          </a:ln>
-        </p:spPr>
-        <p:style>
-          <a:lnRef idx="2">
-            <a:schemeClr val="accent1">
-              <a:shade val="50000"/>
-            </a:schemeClr>
-          </a:lnRef>
-          <a:fillRef idx="1">
-            <a:schemeClr val="accent1"/>
-          </a:fillRef>
-          <a:effectRef idx="0">
-            <a:schemeClr val="accent1"/>
-          </a:effectRef>
-          <a:fontRef idx="minor">
-            <a:schemeClr val="lt1"/>
-          </a:fontRef>
-        </p:style>
-        <p:txBody>
-          <a:bodyPr rtlCol="0" anchor="ctr"/>
-          <a:lstStyle/>
-          <a:p>
-            <a:pPr algn="ctr"/>
-            <a:r>
-              <a:rPr lang="da-DK" sz="1000" dirty="0">
-                <a:solidFill>
-                  <a:schemeClr val="bg1"/>
-                </a:solidFill>
-                <a:latin typeface="Arial" panose="020B0604020202020204" pitchFamily="34" charset="0"/>
-                <a:cs typeface="Arial" panose="020B0604020202020204" pitchFamily="34" charset="0"/>
-              </a:rPr>
-              <a:t>D</a:t>
-            </a:r>
-          </a:p>
-        </p:txBody>
-      </p:sp>
-    </p:spTree>
-    <p:extLst>
-      <p:ext uri="{BB962C8B-B14F-4D97-AF65-F5344CB8AC3E}">
-        <p14:creationId xmlns:p14="http://schemas.microsoft.com/office/powerpoint/2010/main" val="2998229742"/>
-      </p:ext>
-    </p:extLst>
-  </p:cSld>
-  <p:clrMapOvr>
-    <a:masterClrMapping/>
-  </p:clrMapOvr>
-</p:sld>
-</file>
-
-<file path=ppt/slides/slide9.xml><?xml version="1.0" encoding="utf-8"?>
-<p:sld xmlns:a="http://schemas.openxmlformats.org/drawingml/2006/main" xmlns:r="http://schemas.openxmlformats.org/officeDocument/2006/relationships" xmlns:p="http://schemas.openxmlformats.org/presentationml/2006/main">
-  <p:cSld>
-    <p:spTree>
-      <p:nvGrpSpPr>
-        <p:cNvPr id="1" name=""/>
-        <p:cNvGrpSpPr/>
-        <p:nvPr/>
-      </p:nvGrpSpPr>
-      <p:grpSpPr>
-        <a:xfrm>
-          <a:off x="0" y="0"/>
-          <a:ext cx="0" cy="0"/>
-          <a:chOff x="0" y="0"/>
-          <a:chExt cx="0" cy="0"/>
-        </a:xfrm>
-      </p:grpSpPr>
-      <p:sp>
-        <p:nvSpPr>
-          <p:cNvPr id="2" name="Title 1"/>
-          <p:cNvSpPr>
-            <a:spLocks noGrp="1"/>
-          </p:cNvSpPr>
-          <p:nvPr>
-            <p:ph type="title"/>
-          </p:nvPr>
-        </p:nvSpPr>
-        <p:spPr/>
-        <p:txBody>
-          <a:bodyPr/>
-          <a:lstStyle/>
-          <a:p>
-            <a:r>
-              <a:rPr lang="da-DK" dirty="0"/>
-              <a:t>Thank you!</a:t>
-            </a:r>
-          </a:p>
-        </p:txBody>
-      </p:sp>
-      <p:sp>
-        <p:nvSpPr>
-          <p:cNvPr id="3" name="Content Placeholder 2"/>
-          <p:cNvSpPr>
-            <a:spLocks noGrp="1"/>
-          </p:cNvSpPr>
-          <p:nvPr>
-            <p:ph idx="1"/>
-          </p:nvPr>
-        </p:nvSpPr>
-        <p:spPr/>
-        <p:txBody>
-          <a:bodyPr>
-            <a:normAutofit/>
-          </a:bodyPr>
-          <a:lstStyle/>
-          <a:p>
-            <a:r>
-              <a:rPr lang="da-DK" dirty="0"/>
-              <a:t>Advice</a:t>
-            </a:r>
-          </a:p>
-          <a:p>
-            <a:pPr lvl="1"/>
-            <a:r>
-              <a:rPr lang="da-DK" dirty="0"/>
-              <a:t>Understand your tools</a:t>
-            </a:r>
-          </a:p>
-          <a:p>
-            <a:pPr lvl="1"/>
-            <a:r>
-              <a:rPr lang="da-DK" dirty="0"/>
-              <a:t>Keep number of dependencies down</a:t>
-            </a:r>
-          </a:p>
-          <a:p>
-            <a:pPr lvl="1"/>
-            <a:r>
-              <a:rPr lang="da-DK" dirty="0"/>
-              <a:t>Investigate stability of dependencies</a:t>
-            </a:r>
-          </a:p>
-          <a:p>
-            <a:endParaRPr lang="da-DK" dirty="0"/>
-          </a:p>
-          <a:p>
-            <a:r>
-              <a:rPr lang="da-DK" dirty="0"/>
-              <a:t>Resources</a:t>
-            </a:r>
-          </a:p>
-          <a:p>
-            <a:pPr lvl="1"/>
-            <a:r>
-              <a:rPr lang="da-DK" dirty="0"/>
-              <a:t>npm: </a:t>
-            </a:r>
-            <a:r>
-              <a:rPr lang="da-DK" b="1" dirty="0"/>
-              <a:t>create-react-app</a:t>
-            </a:r>
-            <a:r>
-              <a:rPr lang="da-DK" dirty="0"/>
-              <a:t> from Facebook</a:t>
-            </a:r>
-          </a:p>
-          <a:p>
-            <a:pPr lvl="1"/>
-            <a:r>
-              <a:rPr lang="da-DK" dirty="0"/>
-              <a:t>React communication: </a:t>
-            </a:r>
-            <a:r>
-              <a:rPr lang="da-DK" dirty="0">
-                <a:hlinkClick r:id="rId2"/>
-              </a:rPr>
-              <a:t>http://andrewhfarmer.com/component-communication/</a:t>
-            </a:r>
-            <a:endParaRPr lang="da-DK" dirty="0"/>
-          </a:p>
-          <a:p>
-            <a:pPr lvl="1"/>
-            <a:r>
-              <a:rPr lang="da-DK" dirty="0"/>
-              <a:t>React, Webpack and TypeScript documentation sites</a:t>
-            </a:r>
-          </a:p>
-          <a:p>
-            <a:endParaRPr lang="da-DK" dirty="0"/>
-          </a:p>
-          <a:p>
-            <a:r>
-              <a:rPr lang="da-DK" dirty="0"/>
-              <a:t>Twitter: @rasmuskl</a:t>
-            </a:r>
-          </a:p>
-          <a:p>
-            <a:r>
-              <a:rPr lang="da-DK" dirty="0"/>
-              <a:t>Blog: </a:t>
-            </a:r>
-            <a:r>
-              <a:rPr lang="da-DK" dirty="0">
-                <a:hlinkClick r:id="rId3"/>
-              </a:rPr>
-              <a:t>http://rasmuskl.dk</a:t>
-            </a:r>
-            <a:endParaRPr lang="da-DK" dirty="0"/>
-          </a:p>
-          <a:p>
-            <a:endParaRPr lang="da-DK" dirty="0"/>
-          </a:p>
-          <a:p>
-            <a:r>
-              <a:rPr lang="da-DK" dirty="0"/>
-              <a:t>Presentation + Code will be shared at </a:t>
-            </a:r>
-            <a:r>
-              <a:rPr lang="da-DK" dirty="0">
-                <a:hlinkClick r:id="rId4"/>
-              </a:rPr>
-              <a:t>https://github.com/rasmuskl</a:t>
-            </a:r>
-            <a:endParaRPr lang="da-DK" dirty="0"/>
-          </a:p>
-          <a:p>
-            <a:endParaRPr lang="da-DK" dirty="0"/>
-          </a:p>
-          <a:p>
-            <a:endParaRPr lang="da-DK" dirty="0"/>
-          </a:p>
-        </p:txBody>
-      </p:sp>
-      <p:sp>
-        <p:nvSpPr>
-          <p:cNvPr id="4" name="Slide Number Placeholder 3"/>
-          <p:cNvSpPr>
-            <a:spLocks noGrp="1"/>
-          </p:cNvSpPr>
-          <p:nvPr>
-            <p:ph type="sldNum" sz="quarter" idx="12"/>
-          </p:nvPr>
-        </p:nvSpPr>
-        <p:spPr/>
-        <p:txBody>
-          <a:bodyPr/>
-          <a:lstStyle/>
-          <a:p>
-            <a:fld id="{0B0DDA44-FDCB-445C-9AC0-37FB199E677B}" type="slidenum">
-              <a:rPr lang="en-US" smtClean="0"/>
-              <a:pPr/>
-              <a:t>9</a:t>
             </a:fld>
             <a:endParaRPr lang="en-US" dirty="0"/>
           </a:p>
@@ -9154,6 +7923,1229 @@
     <p:extLst>
       <p:ext uri="{BB962C8B-B14F-4D97-AF65-F5344CB8AC3E}">
         <p14:creationId xmlns:p14="http://schemas.microsoft.com/office/powerpoint/2010/main" val="3573977488"/>
+      </p:ext>
+    </p:extLst>
+  </p:cSld>
+  <p:clrMapOvr>
+    <a:masterClrMapping/>
+  </p:clrMapOvr>
+</p:sld>
+</file>
+
+<file path=ppt/slides/slide9.xml><?xml version="1.0" encoding="utf-8"?>
+<p:sld xmlns:a="http://schemas.openxmlformats.org/drawingml/2006/main" xmlns:r="http://schemas.openxmlformats.org/officeDocument/2006/relationships" xmlns:p="http://schemas.openxmlformats.org/presentationml/2006/main" show="0">
+  <p:cSld>
+    <p:spTree>
+      <p:nvGrpSpPr>
+        <p:cNvPr id="1" name=""/>
+        <p:cNvGrpSpPr/>
+        <p:nvPr/>
+      </p:nvGrpSpPr>
+      <p:grpSpPr>
+        <a:xfrm>
+          <a:off x="0" y="0"/>
+          <a:ext cx="0" cy="0"/>
+          <a:chOff x="0" y="0"/>
+          <a:chExt cx="0" cy="0"/>
+        </a:xfrm>
+      </p:grpSpPr>
+      <p:sp>
+        <p:nvSpPr>
+          <p:cNvPr id="76" name="Rectangle 75"/>
+          <p:cNvSpPr/>
+          <p:nvPr/>
+        </p:nvSpPr>
+        <p:spPr>
+          <a:xfrm>
+            <a:off x="2423592" y="1085605"/>
+            <a:ext cx="7344816" cy="3168352"/>
+          </a:xfrm>
+          <a:prstGeom prst="rect">
+            <a:avLst/>
+          </a:prstGeom>
+          <a:ln>
+            <a:prstDash val="sysDash"/>
+          </a:ln>
+        </p:spPr>
+        <p:style>
+          <a:lnRef idx="2">
+            <a:schemeClr val="dk1"/>
+          </a:lnRef>
+          <a:fillRef idx="1">
+            <a:schemeClr val="lt1"/>
+          </a:fillRef>
+          <a:effectRef idx="0">
+            <a:schemeClr val="dk1"/>
+          </a:effectRef>
+          <a:fontRef idx="minor">
+            <a:schemeClr val="dk1"/>
+          </a:fontRef>
+        </p:style>
+        <p:txBody>
+          <a:bodyPr rtlCol="0" anchor="ctr"/>
+          <a:lstStyle/>
+          <a:p>
+            <a:pPr algn="ctr"/>
+            <a:endParaRPr lang="da-DK" sz="900" dirty="0">
+              <a:solidFill>
+                <a:schemeClr val="tx1"/>
+              </a:solidFill>
+              <a:latin typeface="Arial" panose="020B0604020202020204" pitchFamily="34" charset="0"/>
+              <a:cs typeface="Arial" panose="020B0604020202020204" pitchFamily="34" charset="0"/>
+            </a:endParaRPr>
+          </a:p>
+        </p:txBody>
+      </p:sp>
+      <p:sp>
+        <p:nvSpPr>
+          <p:cNvPr id="2" name="Title 1"/>
+          <p:cNvSpPr>
+            <a:spLocks noGrp="1"/>
+          </p:cNvSpPr>
+          <p:nvPr>
+            <p:ph type="title"/>
+          </p:nvPr>
+        </p:nvSpPr>
+        <p:spPr/>
+        <p:txBody>
+          <a:bodyPr/>
+          <a:lstStyle/>
+          <a:p>
+            <a:r>
+              <a:rPr lang="da-DK" dirty="0"/>
+              <a:t>React Reconcillation</a:t>
+            </a:r>
+          </a:p>
+        </p:txBody>
+      </p:sp>
+      <p:sp>
+        <p:nvSpPr>
+          <p:cNvPr id="3" name="Content Placeholder 2"/>
+          <p:cNvSpPr>
+            <a:spLocks noGrp="1"/>
+          </p:cNvSpPr>
+          <p:nvPr>
+            <p:ph idx="1"/>
+          </p:nvPr>
+        </p:nvSpPr>
+        <p:spPr/>
+        <p:txBody>
+          <a:bodyPr/>
+          <a:lstStyle/>
+          <a:p>
+            <a:pPr lvl="1"/>
+            <a:endParaRPr lang="da-DK" dirty="0"/>
+          </a:p>
+          <a:p>
+            <a:endParaRPr lang="da-DK" dirty="0"/>
+          </a:p>
+        </p:txBody>
+      </p:sp>
+      <p:sp>
+        <p:nvSpPr>
+          <p:cNvPr id="4" name="Slide Number Placeholder 3"/>
+          <p:cNvSpPr>
+            <a:spLocks noGrp="1"/>
+          </p:cNvSpPr>
+          <p:nvPr>
+            <p:ph type="sldNum" sz="quarter" idx="12"/>
+          </p:nvPr>
+        </p:nvSpPr>
+        <p:spPr/>
+        <p:txBody>
+          <a:bodyPr/>
+          <a:lstStyle/>
+          <a:p>
+            <a:fld id="{0B0DDA44-FDCB-445C-9AC0-37FB199E677B}" type="slidenum">
+              <a:rPr lang="en-US" smtClean="0"/>
+              <a:pPr/>
+              <a:t>9</a:t>
+            </a:fld>
+            <a:endParaRPr lang="en-US" dirty="0"/>
+          </a:p>
+        </p:txBody>
+      </p:sp>
+      <p:sp>
+        <p:nvSpPr>
+          <p:cNvPr id="5" name="Rectangle 4"/>
+          <p:cNvSpPr/>
+          <p:nvPr/>
+        </p:nvSpPr>
+        <p:spPr>
+          <a:xfrm>
+            <a:off x="3236744" y="1547035"/>
+            <a:ext cx="720000" cy="504056"/>
+          </a:xfrm>
+          <a:prstGeom prst="rect">
+            <a:avLst/>
+          </a:prstGeom>
+          <a:ln/>
+        </p:spPr>
+        <p:style>
+          <a:lnRef idx="2">
+            <a:schemeClr val="accent1">
+              <a:shade val="50000"/>
+            </a:schemeClr>
+          </a:lnRef>
+          <a:fillRef idx="1">
+            <a:schemeClr val="accent1"/>
+          </a:fillRef>
+          <a:effectRef idx="0">
+            <a:schemeClr val="accent1"/>
+          </a:effectRef>
+          <a:fontRef idx="minor">
+            <a:schemeClr val="lt1"/>
+          </a:fontRef>
+        </p:style>
+        <p:txBody>
+          <a:bodyPr rtlCol="0" anchor="ctr"/>
+          <a:lstStyle/>
+          <a:p>
+            <a:pPr algn="ctr"/>
+            <a:r>
+              <a:rPr lang="da-DK" sz="1600" dirty="0">
+                <a:solidFill>
+                  <a:schemeClr val="bg1"/>
+                </a:solidFill>
+                <a:latin typeface="Arial" panose="020B0604020202020204" pitchFamily="34" charset="0"/>
+                <a:cs typeface="Arial" panose="020B0604020202020204" pitchFamily="34" charset="0"/>
+              </a:rPr>
+              <a:t>div</a:t>
+            </a:r>
+          </a:p>
+        </p:txBody>
+      </p:sp>
+      <p:sp>
+        <p:nvSpPr>
+          <p:cNvPr id="7" name="Rectangle 6"/>
+          <p:cNvSpPr/>
+          <p:nvPr/>
+        </p:nvSpPr>
+        <p:spPr>
+          <a:xfrm>
+            <a:off x="2860376" y="2503743"/>
+            <a:ext cx="720000" cy="504056"/>
+          </a:xfrm>
+          <a:prstGeom prst="rect">
+            <a:avLst/>
+          </a:prstGeom>
+          <a:ln/>
+        </p:spPr>
+        <p:style>
+          <a:lnRef idx="2">
+            <a:schemeClr val="accent1">
+              <a:shade val="50000"/>
+            </a:schemeClr>
+          </a:lnRef>
+          <a:fillRef idx="1">
+            <a:schemeClr val="accent1"/>
+          </a:fillRef>
+          <a:effectRef idx="0">
+            <a:schemeClr val="accent1"/>
+          </a:effectRef>
+          <a:fontRef idx="minor">
+            <a:schemeClr val="lt1"/>
+          </a:fontRef>
+        </p:style>
+        <p:txBody>
+          <a:bodyPr rtlCol="0" anchor="ctr"/>
+          <a:lstStyle/>
+          <a:p>
+            <a:pPr algn="ctr"/>
+            <a:r>
+              <a:rPr lang="da-DK" sz="1600" dirty="0">
+                <a:solidFill>
+                  <a:schemeClr val="bg1"/>
+                </a:solidFill>
+                <a:latin typeface="Arial" panose="020B0604020202020204" pitchFamily="34" charset="0"/>
+                <a:cs typeface="Arial" panose="020B0604020202020204" pitchFamily="34" charset="0"/>
+              </a:rPr>
+              <a:t>h1</a:t>
+            </a:r>
+          </a:p>
+        </p:txBody>
+      </p:sp>
+      <p:sp>
+        <p:nvSpPr>
+          <p:cNvPr id="8" name="Rectangle 7"/>
+          <p:cNvSpPr/>
+          <p:nvPr/>
+        </p:nvSpPr>
+        <p:spPr>
+          <a:xfrm>
+            <a:off x="3699777" y="2503743"/>
+            <a:ext cx="720000" cy="504056"/>
+          </a:xfrm>
+          <a:prstGeom prst="rect">
+            <a:avLst/>
+          </a:prstGeom>
+          <a:ln/>
+        </p:spPr>
+        <p:style>
+          <a:lnRef idx="2">
+            <a:schemeClr val="accent1">
+              <a:shade val="50000"/>
+            </a:schemeClr>
+          </a:lnRef>
+          <a:fillRef idx="1">
+            <a:schemeClr val="accent1"/>
+          </a:fillRef>
+          <a:effectRef idx="0">
+            <a:schemeClr val="accent1"/>
+          </a:effectRef>
+          <a:fontRef idx="minor">
+            <a:schemeClr val="lt1"/>
+          </a:fontRef>
+        </p:style>
+        <p:txBody>
+          <a:bodyPr rtlCol="0" anchor="ctr"/>
+          <a:lstStyle/>
+          <a:p>
+            <a:pPr algn="ctr"/>
+            <a:r>
+              <a:rPr lang="da-DK" sz="1600" dirty="0">
+                <a:solidFill>
+                  <a:schemeClr val="bg1"/>
+                </a:solidFill>
+                <a:latin typeface="Arial" panose="020B0604020202020204" pitchFamily="34" charset="0"/>
+                <a:cs typeface="Arial" panose="020B0604020202020204" pitchFamily="34" charset="0"/>
+              </a:rPr>
+              <a:t>ul</a:t>
+            </a:r>
+          </a:p>
+        </p:txBody>
+      </p:sp>
+      <p:sp>
+        <p:nvSpPr>
+          <p:cNvPr id="9" name="Rectangle 8"/>
+          <p:cNvSpPr/>
+          <p:nvPr/>
+        </p:nvSpPr>
+        <p:spPr>
+          <a:xfrm>
+            <a:off x="3339777" y="3468232"/>
+            <a:ext cx="720000" cy="504056"/>
+          </a:xfrm>
+          <a:prstGeom prst="rect">
+            <a:avLst/>
+          </a:prstGeom>
+          <a:ln/>
+        </p:spPr>
+        <p:style>
+          <a:lnRef idx="2">
+            <a:schemeClr val="accent1">
+              <a:shade val="50000"/>
+            </a:schemeClr>
+          </a:lnRef>
+          <a:fillRef idx="1">
+            <a:schemeClr val="accent1"/>
+          </a:fillRef>
+          <a:effectRef idx="0">
+            <a:schemeClr val="accent1"/>
+          </a:effectRef>
+          <a:fontRef idx="minor">
+            <a:schemeClr val="lt1"/>
+          </a:fontRef>
+        </p:style>
+        <p:txBody>
+          <a:bodyPr rtlCol="0" anchor="ctr"/>
+          <a:lstStyle/>
+          <a:p>
+            <a:pPr algn="ctr"/>
+            <a:r>
+              <a:rPr lang="da-DK" sz="1600" dirty="0">
+                <a:solidFill>
+                  <a:schemeClr val="bg1"/>
+                </a:solidFill>
+                <a:latin typeface="Arial" panose="020B0604020202020204" pitchFamily="34" charset="0"/>
+                <a:cs typeface="Arial" panose="020B0604020202020204" pitchFamily="34" charset="0"/>
+              </a:rPr>
+              <a:t>li</a:t>
+            </a:r>
+          </a:p>
+        </p:txBody>
+      </p:sp>
+      <p:sp>
+        <p:nvSpPr>
+          <p:cNvPr id="10" name="Rectangle 9"/>
+          <p:cNvSpPr/>
+          <p:nvPr/>
+        </p:nvSpPr>
+        <p:spPr>
+          <a:xfrm>
+            <a:off x="4162810" y="3469944"/>
+            <a:ext cx="720000" cy="504056"/>
+          </a:xfrm>
+          <a:prstGeom prst="rect">
+            <a:avLst/>
+          </a:prstGeom>
+          <a:ln/>
+        </p:spPr>
+        <p:style>
+          <a:lnRef idx="2">
+            <a:schemeClr val="accent1">
+              <a:shade val="50000"/>
+            </a:schemeClr>
+          </a:lnRef>
+          <a:fillRef idx="1">
+            <a:schemeClr val="accent1"/>
+          </a:fillRef>
+          <a:effectRef idx="0">
+            <a:schemeClr val="accent1"/>
+          </a:effectRef>
+          <a:fontRef idx="minor">
+            <a:schemeClr val="lt1"/>
+          </a:fontRef>
+        </p:style>
+        <p:txBody>
+          <a:bodyPr rtlCol="0" anchor="ctr"/>
+          <a:lstStyle/>
+          <a:p>
+            <a:pPr algn="ctr"/>
+            <a:r>
+              <a:rPr lang="da-DK" sz="1600" dirty="0">
+                <a:solidFill>
+                  <a:schemeClr val="bg1"/>
+                </a:solidFill>
+                <a:latin typeface="Arial" panose="020B0604020202020204" pitchFamily="34" charset="0"/>
+                <a:cs typeface="Arial" panose="020B0604020202020204" pitchFamily="34" charset="0"/>
+              </a:rPr>
+              <a:t>li</a:t>
+            </a:r>
+          </a:p>
+        </p:txBody>
+      </p:sp>
+      <p:cxnSp>
+        <p:nvCxnSpPr>
+          <p:cNvPr id="12" name="Straight Connector 11"/>
+          <p:cNvCxnSpPr>
+            <a:stCxn id="5" idx="2"/>
+            <a:endCxn id="7" idx="0"/>
+          </p:cNvCxnSpPr>
+          <p:nvPr/>
+        </p:nvCxnSpPr>
+        <p:spPr>
+          <a:xfrm flipH="1">
+            <a:off x="3220376" y="2051091"/>
+            <a:ext cx="376368" cy="452652"/>
+          </a:xfrm>
+          <a:prstGeom prst="line">
+            <a:avLst/>
+          </a:prstGeom>
+        </p:spPr>
+        <p:style>
+          <a:lnRef idx="1">
+            <a:schemeClr val="accent1"/>
+          </a:lnRef>
+          <a:fillRef idx="0">
+            <a:schemeClr val="accent1"/>
+          </a:fillRef>
+          <a:effectRef idx="0">
+            <a:schemeClr val="accent1"/>
+          </a:effectRef>
+          <a:fontRef idx="minor">
+            <a:schemeClr val="tx1"/>
+          </a:fontRef>
+        </p:style>
+      </p:cxnSp>
+      <p:cxnSp>
+        <p:nvCxnSpPr>
+          <p:cNvPr id="17" name="Straight Connector 16"/>
+          <p:cNvCxnSpPr>
+            <a:stCxn id="5" idx="2"/>
+            <a:endCxn id="8" idx="0"/>
+          </p:cNvCxnSpPr>
+          <p:nvPr/>
+        </p:nvCxnSpPr>
+        <p:spPr>
+          <a:xfrm>
+            <a:off x="3596744" y="2051091"/>
+            <a:ext cx="463033" cy="452652"/>
+          </a:xfrm>
+          <a:prstGeom prst="line">
+            <a:avLst/>
+          </a:prstGeom>
+        </p:spPr>
+        <p:style>
+          <a:lnRef idx="1">
+            <a:schemeClr val="accent1"/>
+          </a:lnRef>
+          <a:fillRef idx="0">
+            <a:schemeClr val="accent1"/>
+          </a:fillRef>
+          <a:effectRef idx="0">
+            <a:schemeClr val="accent1"/>
+          </a:effectRef>
+          <a:fontRef idx="minor">
+            <a:schemeClr val="tx1"/>
+          </a:fontRef>
+        </p:style>
+      </p:cxnSp>
+      <p:cxnSp>
+        <p:nvCxnSpPr>
+          <p:cNvPr id="19" name="Straight Connector 18"/>
+          <p:cNvCxnSpPr>
+            <a:stCxn id="8" idx="2"/>
+            <a:endCxn id="9" idx="0"/>
+          </p:cNvCxnSpPr>
+          <p:nvPr/>
+        </p:nvCxnSpPr>
+        <p:spPr>
+          <a:xfrm flipH="1">
+            <a:off x="3699777" y="3007799"/>
+            <a:ext cx="360000" cy="460433"/>
+          </a:xfrm>
+          <a:prstGeom prst="line">
+            <a:avLst/>
+          </a:prstGeom>
+        </p:spPr>
+        <p:style>
+          <a:lnRef idx="1">
+            <a:schemeClr val="accent1"/>
+          </a:lnRef>
+          <a:fillRef idx="0">
+            <a:schemeClr val="accent1"/>
+          </a:fillRef>
+          <a:effectRef idx="0">
+            <a:schemeClr val="accent1"/>
+          </a:effectRef>
+          <a:fontRef idx="minor">
+            <a:schemeClr val="tx1"/>
+          </a:fontRef>
+        </p:style>
+      </p:cxnSp>
+      <p:cxnSp>
+        <p:nvCxnSpPr>
+          <p:cNvPr id="21" name="Straight Connector 20"/>
+          <p:cNvCxnSpPr>
+            <a:stCxn id="8" idx="2"/>
+            <a:endCxn id="10" idx="0"/>
+          </p:cNvCxnSpPr>
+          <p:nvPr/>
+        </p:nvCxnSpPr>
+        <p:spPr>
+          <a:xfrm>
+            <a:off x="4059777" y="3007799"/>
+            <a:ext cx="463033" cy="462145"/>
+          </a:xfrm>
+          <a:prstGeom prst="line">
+            <a:avLst/>
+          </a:prstGeom>
+        </p:spPr>
+        <p:style>
+          <a:lnRef idx="1">
+            <a:schemeClr val="accent1"/>
+          </a:lnRef>
+          <a:fillRef idx="0">
+            <a:schemeClr val="accent1"/>
+          </a:fillRef>
+          <a:effectRef idx="0">
+            <a:schemeClr val="accent1"/>
+          </a:effectRef>
+          <a:fontRef idx="minor">
+            <a:schemeClr val="tx1"/>
+          </a:fontRef>
+        </p:style>
+      </p:cxnSp>
+      <p:sp>
+        <p:nvSpPr>
+          <p:cNvPr id="57" name="Rectangle 56"/>
+          <p:cNvSpPr/>
+          <p:nvPr/>
+        </p:nvSpPr>
+        <p:spPr>
+          <a:xfrm>
+            <a:off x="7231939" y="1547035"/>
+            <a:ext cx="720000" cy="504056"/>
+          </a:xfrm>
+          <a:prstGeom prst="rect">
+            <a:avLst/>
+          </a:prstGeom>
+          <a:ln/>
+        </p:spPr>
+        <p:style>
+          <a:lnRef idx="2">
+            <a:schemeClr val="accent1">
+              <a:shade val="50000"/>
+            </a:schemeClr>
+          </a:lnRef>
+          <a:fillRef idx="1">
+            <a:schemeClr val="accent1"/>
+          </a:fillRef>
+          <a:effectRef idx="0">
+            <a:schemeClr val="accent1"/>
+          </a:effectRef>
+          <a:fontRef idx="minor">
+            <a:schemeClr val="lt1"/>
+          </a:fontRef>
+        </p:style>
+        <p:txBody>
+          <a:bodyPr rtlCol="0" anchor="ctr"/>
+          <a:lstStyle/>
+          <a:p>
+            <a:pPr algn="ctr"/>
+            <a:r>
+              <a:rPr lang="da-DK" sz="1600" dirty="0">
+                <a:solidFill>
+                  <a:schemeClr val="bg1"/>
+                </a:solidFill>
+                <a:latin typeface="Arial" panose="020B0604020202020204" pitchFamily="34" charset="0"/>
+                <a:cs typeface="Arial" panose="020B0604020202020204" pitchFamily="34" charset="0"/>
+              </a:rPr>
+              <a:t>div</a:t>
+            </a:r>
+          </a:p>
+        </p:txBody>
+      </p:sp>
+      <p:sp>
+        <p:nvSpPr>
+          <p:cNvPr id="58" name="Rectangle 57"/>
+          <p:cNvSpPr/>
+          <p:nvPr/>
+        </p:nvSpPr>
+        <p:spPr>
+          <a:xfrm>
+            <a:off x="6855571" y="2503743"/>
+            <a:ext cx="720000" cy="504056"/>
+          </a:xfrm>
+          <a:prstGeom prst="rect">
+            <a:avLst/>
+          </a:prstGeom>
+          <a:ln/>
+        </p:spPr>
+        <p:style>
+          <a:lnRef idx="2">
+            <a:schemeClr val="accent1">
+              <a:shade val="50000"/>
+            </a:schemeClr>
+          </a:lnRef>
+          <a:fillRef idx="1">
+            <a:schemeClr val="accent1"/>
+          </a:fillRef>
+          <a:effectRef idx="0">
+            <a:schemeClr val="accent1"/>
+          </a:effectRef>
+          <a:fontRef idx="minor">
+            <a:schemeClr val="lt1"/>
+          </a:fontRef>
+        </p:style>
+        <p:txBody>
+          <a:bodyPr rtlCol="0" anchor="ctr"/>
+          <a:lstStyle/>
+          <a:p>
+            <a:pPr algn="ctr"/>
+            <a:r>
+              <a:rPr lang="da-DK" sz="1600" dirty="0">
+                <a:solidFill>
+                  <a:schemeClr val="bg1"/>
+                </a:solidFill>
+                <a:latin typeface="Arial" panose="020B0604020202020204" pitchFamily="34" charset="0"/>
+                <a:cs typeface="Arial" panose="020B0604020202020204" pitchFamily="34" charset="0"/>
+              </a:rPr>
+              <a:t>h1</a:t>
+            </a:r>
+          </a:p>
+        </p:txBody>
+      </p:sp>
+      <p:sp>
+        <p:nvSpPr>
+          <p:cNvPr id="59" name="Rectangle 58"/>
+          <p:cNvSpPr/>
+          <p:nvPr/>
+        </p:nvSpPr>
+        <p:spPr>
+          <a:xfrm>
+            <a:off x="7694972" y="2503743"/>
+            <a:ext cx="720000" cy="504056"/>
+          </a:xfrm>
+          <a:prstGeom prst="rect">
+            <a:avLst/>
+          </a:prstGeom>
+          <a:ln/>
+        </p:spPr>
+        <p:style>
+          <a:lnRef idx="2">
+            <a:schemeClr val="accent1">
+              <a:shade val="50000"/>
+            </a:schemeClr>
+          </a:lnRef>
+          <a:fillRef idx="1">
+            <a:schemeClr val="accent1"/>
+          </a:fillRef>
+          <a:effectRef idx="0">
+            <a:schemeClr val="accent1"/>
+          </a:effectRef>
+          <a:fontRef idx="minor">
+            <a:schemeClr val="lt1"/>
+          </a:fontRef>
+        </p:style>
+        <p:txBody>
+          <a:bodyPr rtlCol="0" anchor="ctr"/>
+          <a:lstStyle/>
+          <a:p>
+            <a:pPr algn="ctr"/>
+            <a:r>
+              <a:rPr lang="da-DK" sz="1600" dirty="0">
+                <a:solidFill>
+                  <a:schemeClr val="bg1"/>
+                </a:solidFill>
+                <a:latin typeface="Arial" panose="020B0604020202020204" pitchFamily="34" charset="0"/>
+                <a:cs typeface="Arial" panose="020B0604020202020204" pitchFamily="34" charset="0"/>
+              </a:rPr>
+              <a:t>ul</a:t>
+            </a:r>
+          </a:p>
+        </p:txBody>
+      </p:sp>
+      <p:sp>
+        <p:nvSpPr>
+          <p:cNvPr id="60" name="Rectangle 59"/>
+          <p:cNvSpPr/>
+          <p:nvPr/>
+        </p:nvSpPr>
+        <p:spPr>
+          <a:xfrm>
+            <a:off x="7334972" y="3468232"/>
+            <a:ext cx="720000" cy="504056"/>
+          </a:xfrm>
+          <a:prstGeom prst="rect">
+            <a:avLst/>
+          </a:prstGeom>
+          <a:ln/>
+        </p:spPr>
+        <p:style>
+          <a:lnRef idx="2">
+            <a:schemeClr val="accent1">
+              <a:shade val="50000"/>
+            </a:schemeClr>
+          </a:lnRef>
+          <a:fillRef idx="1">
+            <a:schemeClr val="accent1"/>
+          </a:fillRef>
+          <a:effectRef idx="0">
+            <a:schemeClr val="accent1"/>
+          </a:effectRef>
+          <a:fontRef idx="minor">
+            <a:schemeClr val="lt1"/>
+          </a:fontRef>
+        </p:style>
+        <p:txBody>
+          <a:bodyPr rtlCol="0" anchor="ctr"/>
+          <a:lstStyle/>
+          <a:p>
+            <a:pPr algn="ctr"/>
+            <a:r>
+              <a:rPr lang="da-DK" sz="1600" dirty="0">
+                <a:solidFill>
+                  <a:schemeClr val="bg1"/>
+                </a:solidFill>
+                <a:latin typeface="Arial" panose="020B0604020202020204" pitchFamily="34" charset="0"/>
+                <a:cs typeface="Arial" panose="020B0604020202020204" pitchFamily="34" charset="0"/>
+              </a:rPr>
+              <a:t>li</a:t>
+            </a:r>
+          </a:p>
+        </p:txBody>
+      </p:sp>
+      <p:sp>
+        <p:nvSpPr>
+          <p:cNvPr id="61" name="Rectangle 60"/>
+          <p:cNvSpPr/>
+          <p:nvPr/>
+        </p:nvSpPr>
+        <p:spPr>
+          <a:xfrm>
+            <a:off x="8158005" y="3469944"/>
+            <a:ext cx="720000" cy="504056"/>
+          </a:xfrm>
+          <a:prstGeom prst="rect">
+            <a:avLst/>
+          </a:prstGeom>
+          <a:ln/>
+        </p:spPr>
+        <p:style>
+          <a:lnRef idx="2">
+            <a:schemeClr val="accent1">
+              <a:shade val="50000"/>
+            </a:schemeClr>
+          </a:lnRef>
+          <a:fillRef idx="1">
+            <a:schemeClr val="accent1"/>
+          </a:fillRef>
+          <a:effectRef idx="0">
+            <a:schemeClr val="accent1"/>
+          </a:effectRef>
+          <a:fontRef idx="minor">
+            <a:schemeClr val="lt1"/>
+          </a:fontRef>
+        </p:style>
+        <p:txBody>
+          <a:bodyPr rtlCol="0" anchor="ctr"/>
+          <a:lstStyle/>
+          <a:p>
+            <a:pPr algn="ctr"/>
+            <a:r>
+              <a:rPr lang="da-DK" sz="1600" dirty="0">
+                <a:solidFill>
+                  <a:schemeClr val="bg1"/>
+                </a:solidFill>
+                <a:latin typeface="Arial" panose="020B0604020202020204" pitchFamily="34" charset="0"/>
+                <a:cs typeface="Arial" panose="020B0604020202020204" pitchFamily="34" charset="0"/>
+              </a:rPr>
+              <a:t>li</a:t>
+            </a:r>
+          </a:p>
+        </p:txBody>
+      </p:sp>
+      <p:cxnSp>
+        <p:nvCxnSpPr>
+          <p:cNvPr id="62" name="Straight Connector 61"/>
+          <p:cNvCxnSpPr>
+            <a:stCxn id="57" idx="2"/>
+            <a:endCxn id="58" idx="0"/>
+          </p:cNvCxnSpPr>
+          <p:nvPr/>
+        </p:nvCxnSpPr>
+        <p:spPr>
+          <a:xfrm flipH="1">
+            <a:off x="7215571" y="2051091"/>
+            <a:ext cx="376368" cy="452652"/>
+          </a:xfrm>
+          <a:prstGeom prst="line">
+            <a:avLst/>
+          </a:prstGeom>
+        </p:spPr>
+        <p:style>
+          <a:lnRef idx="1">
+            <a:schemeClr val="accent1"/>
+          </a:lnRef>
+          <a:fillRef idx="0">
+            <a:schemeClr val="accent1"/>
+          </a:fillRef>
+          <a:effectRef idx="0">
+            <a:schemeClr val="accent1"/>
+          </a:effectRef>
+          <a:fontRef idx="minor">
+            <a:schemeClr val="tx1"/>
+          </a:fontRef>
+        </p:style>
+      </p:cxnSp>
+      <p:cxnSp>
+        <p:nvCxnSpPr>
+          <p:cNvPr id="63" name="Straight Connector 62"/>
+          <p:cNvCxnSpPr>
+            <a:stCxn id="57" idx="2"/>
+            <a:endCxn id="59" idx="0"/>
+          </p:cNvCxnSpPr>
+          <p:nvPr/>
+        </p:nvCxnSpPr>
+        <p:spPr>
+          <a:xfrm>
+            <a:off x="7591939" y="2051091"/>
+            <a:ext cx="463033" cy="452652"/>
+          </a:xfrm>
+          <a:prstGeom prst="line">
+            <a:avLst/>
+          </a:prstGeom>
+        </p:spPr>
+        <p:style>
+          <a:lnRef idx="1">
+            <a:schemeClr val="accent1"/>
+          </a:lnRef>
+          <a:fillRef idx="0">
+            <a:schemeClr val="accent1"/>
+          </a:fillRef>
+          <a:effectRef idx="0">
+            <a:schemeClr val="accent1"/>
+          </a:effectRef>
+          <a:fontRef idx="minor">
+            <a:schemeClr val="tx1"/>
+          </a:fontRef>
+        </p:style>
+      </p:cxnSp>
+      <p:cxnSp>
+        <p:nvCxnSpPr>
+          <p:cNvPr id="64" name="Straight Connector 63"/>
+          <p:cNvCxnSpPr>
+            <a:stCxn id="59" idx="2"/>
+            <a:endCxn id="60" idx="0"/>
+          </p:cNvCxnSpPr>
+          <p:nvPr/>
+        </p:nvCxnSpPr>
+        <p:spPr>
+          <a:xfrm flipH="1">
+            <a:off x="7694972" y="3007799"/>
+            <a:ext cx="360000" cy="460433"/>
+          </a:xfrm>
+          <a:prstGeom prst="line">
+            <a:avLst/>
+          </a:prstGeom>
+        </p:spPr>
+        <p:style>
+          <a:lnRef idx="1">
+            <a:schemeClr val="accent1"/>
+          </a:lnRef>
+          <a:fillRef idx="0">
+            <a:schemeClr val="accent1"/>
+          </a:fillRef>
+          <a:effectRef idx="0">
+            <a:schemeClr val="accent1"/>
+          </a:effectRef>
+          <a:fontRef idx="minor">
+            <a:schemeClr val="tx1"/>
+          </a:fontRef>
+        </p:style>
+      </p:cxnSp>
+      <p:cxnSp>
+        <p:nvCxnSpPr>
+          <p:cNvPr id="65" name="Straight Connector 64"/>
+          <p:cNvCxnSpPr>
+            <a:stCxn id="59" idx="2"/>
+            <a:endCxn id="61" idx="0"/>
+          </p:cNvCxnSpPr>
+          <p:nvPr/>
+        </p:nvCxnSpPr>
+        <p:spPr>
+          <a:xfrm>
+            <a:off x="8054972" y="3007799"/>
+            <a:ext cx="463033" cy="462145"/>
+          </a:xfrm>
+          <a:prstGeom prst="line">
+            <a:avLst/>
+          </a:prstGeom>
+        </p:spPr>
+        <p:style>
+          <a:lnRef idx="1">
+            <a:schemeClr val="accent1"/>
+          </a:lnRef>
+          <a:fillRef idx="0">
+            <a:schemeClr val="accent1"/>
+          </a:fillRef>
+          <a:effectRef idx="0">
+            <a:schemeClr val="accent1"/>
+          </a:effectRef>
+          <a:fontRef idx="minor">
+            <a:schemeClr val="tx1"/>
+          </a:fontRef>
+        </p:style>
+      </p:cxnSp>
+      <p:sp>
+        <p:nvSpPr>
+          <p:cNvPr id="66" name="Rectangle 65"/>
+          <p:cNvSpPr/>
+          <p:nvPr/>
+        </p:nvSpPr>
+        <p:spPr>
+          <a:xfrm>
+            <a:off x="8534373" y="2503743"/>
+            <a:ext cx="720000" cy="504056"/>
+          </a:xfrm>
+          <a:prstGeom prst="rect">
+            <a:avLst/>
+          </a:prstGeom>
+          <a:ln/>
+        </p:spPr>
+        <p:style>
+          <a:lnRef idx="2">
+            <a:schemeClr val="accent3">
+              <a:shade val="50000"/>
+            </a:schemeClr>
+          </a:lnRef>
+          <a:fillRef idx="1">
+            <a:schemeClr val="accent3"/>
+          </a:fillRef>
+          <a:effectRef idx="0">
+            <a:schemeClr val="accent3"/>
+          </a:effectRef>
+          <a:fontRef idx="minor">
+            <a:schemeClr val="lt1"/>
+          </a:fontRef>
+        </p:style>
+        <p:txBody>
+          <a:bodyPr rtlCol="0" anchor="ctr"/>
+          <a:lstStyle/>
+          <a:p>
+            <a:pPr algn="ctr"/>
+            <a:r>
+              <a:rPr lang="da-DK" sz="1600" dirty="0">
+                <a:solidFill>
+                  <a:schemeClr val="bg1"/>
+                </a:solidFill>
+                <a:latin typeface="Arial" panose="020B0604020202020204" pitchFamily="34" charset="0"/>
+                <a:cs typeface="Arial" panose="020B0604020202020204" pitchFamily="34" charset="0"/>
+              </a:rPr>
+              <a:t>p</a:t>
+            </a:r>
+          </a:p>
+        </p:txBody>
+      </p:sp>
+      <p:cxnSp>
+        <p:nvCxnSpPr>
+          <p:cNvPr id="71" name="Straight Connector 70"/>
+          <p:cNvCxnSpPr>
+            <a:stCxn id="57" idx="2"/>
+            <a:endCxn id="66" idx="0"/>
+          </p:cNvCxnSpPr>
+          <p:nvPr/>
+        </p:nvCxnSpPr>
+        <p:spPr>
+          <a:xfrm>
+            <a:off x="7591939" y="2051091"/>
+            <a:ext cx="1302434" cy="452652"/>
+          </a:xfrm>
+          <a:prstGeom prst="line">
+            <a:avLst/>
+          </a:prstGeom>
+        </p:spPr>
+        <p:style>
+          <a:lnRef idx="1">
+            <a:schemeClr val="accent3"/>
+          </a:lnRef>
+          <a:fillRef idx="0">
+            <a:schemeClr val="accent3"/>
+          </a:fillRef>
+          <a:effectRef idx="0">
+            <a:schemeClr val="accent3"/>
+          </a:effectRef>
+          <a:fontRef idx="minor">
+            <a:schemeClr val="tx1"/>
+          </a:fontRef>
+        </p:style>
+      </p:cxnSp>
+      <p:sp>
+        <p:nvSpPr>
+          <p:cNvPr id="75" name="Arrow: Down 74"/>
+          <p:cNvSpPr/>
+          <p:nvPr/>
+        </p:nvSpPr>
+        <p:spPr>
+          <a:xfrm>
+            <a:off x="5657705" y="4192795"/>
+            <a:ext cx="432048" cy="840648"/>
+          </a:xfrm>
+          <a:prstGeom prst="downArrow">
+            <a:avLst/>
+          </a:prstGeom>
+          <a:solidFill>
+            <a:schemeClr val="tx1"/>
+          </a:solidFill>
+          <a:ln w="9525">
+            <a:noFill/>
+            <a:prstDash val="dash"/>
+          </a:ln>
+        </p:spPr>
+        <p:style>
+          <a:lnRef idx="2">
+            <a:schemeClr val="accent1">
+              <a:shade val="50000"/>
+            </a:schemeClr>
+          </a:lnRef>
+          <a:fillRef idx="1">
+            <a:schemeClr val="accent1"/>
+          </a:fillRef>
+          <a:effectRef idx="0">
+            <a:schemeClr val="accent1"/>
+          </a:effectRef>
+          <a:fontRef idx="minor">
+            <a:schemeClr val="lt1"/>
+          </a:fontRef>
+        </p:style>
+        <p:txBody>
+          <a:bodyPr rtlCol="0" anchor="ctr"/>
+          <a:lstStyle/>
+          <a:p>
+            <a:pPr algn="ctr"/>
+            <a:endParaRPr lang="da-DK" sz="900" dirty="0">
+              <a:solidFill>
+                <a:schemeClr val="tx1"/>
+              </a:solidFill>
+              <a:latin typeface="Arial" panose="020B0604020202020204" pitchFamily="34" charset="0"/>
+              <a:cs typeface="Arial" panose="020B0604020202020204" pitchFamily="34" charset="0"/>
+            </a:endParaRPr>
+          </a:p>
+        </p:txBody>
+      </p:sp>
+      <p:sp>
+        <p:nvSpPr>
+          <p:cNvPr id="77" name="Arrow: Left-Right 76"/>
+          <p:cNvSpPr/>
+          <p:nvPr/>
+        </p:nvSpPr>
+        <p:spPr>
+          <a:xfrm>
+            <a:off x="5297665" y="2503743"/>
+            <a:ext cx="1152128" cy="382062"/>
+          </a:xfrm>
+          <a:prstGeom prst="leftRightArrow">
+            <a:avLst/>
+          </a:prstGeom>
+          <a:solidFill>
+            <a:schemeClr val="tx1"/>
+          </a:solidFill>
+          <a:ln w="9525">
+            <a:noFill/>
+            <a:prstDash val="dash"/>
+          </a:ln>
+        </p:spPr>
+        <p:style>
+          <a:lnRef idx="2">
+            <a:schemeClr val="accent1">
+              <a:shade val="50000"/>
+            </a:schemeClr>
+          </a:lnRef>
+          <a:fillRef idx="1">
+            <a:schemeClr val="accent1"/>
+          </a:fillRef>
+          <a:effectRef idx="0">
+            <a:schemeClr val="accent1"/>
+          </a:effectRef>
+          <a:fontRef idx="minor">
+            <a:schemeClr val="lt1"/>
+          </a:fontRef>
+        </p:style>
+        <p:txBody>
+          <a:bodyPr rtlCol="0" anchor="ctr"/>
+          <a:lstStyle/>
+          <a:p>
+            <a:pPr algn="ctr"/>
+            <a:endParaRPr lang="da-DK" sz="900" dirty="0">
+              <a:solidFill>
+                <a:schemeClr val="tx1"/>
+              </a:solidFill>
+              <a:latin typeface="Arial" panose="020B0604020202020204" pitchFamily="34" charset="0"/>
+              <a:cs typeface="Arial" panose="020B0604020202020204" pitchFamily="34" charset="0"/>
+            </a:endParaRPr>
+          </a:p>
+        </p:txBody>
+      </p:sp>
+      <p:sp>
+        <p:nvSpPr>
+          <p:cNvPr id="78" name="TextBox 77"/>
+          <p:cNvSpPr txBox="1"/>
+          <p:nvPr/>
+        </p:nvSpPr>
+        <p:spPr>
+          <a:xfrm>
+            <a:off x="5530944" y="2228313"/>
+            <a:ext cx="626202" cy="369332"/>
+          </a:xfrm>
+          <a:prstGeom prst="rect">
+            <a:avLst/>
+          </a:prstGeom>
+          <a:noFill/>
+        </p:spPr>
+        <p:txBody>
+          <a:bodyPr wrap="square" lIns="0" tIns="0" rIns="0" bIns="0" rtlCol="0">
+            <a:spAutoFit/>
+          </a:bodyPr>
+          <a:lstStyle/>
+          <a:p>
+            <a:pPr algn="ctr"/>
+            <a:r>
+              <a:rPr lang="da-DK" sz="2400" dirty="0">
+                <a:latin typeface="Arial" panose="020B0604020202020204" pitchFamily="34" charset="0"/>
+                <a:ea typeface="Open Sans" panose="020B0606030504020204" pitchFamily="34" charset="0"/>
+                <a:cs typeface="Arial" panose="020B0604020202020204" pitchFamily="34" charset="0"/>
+              </a:rPr>
+              <a:t>diff</a:t>
+            </a:r>
+          </a:p>
+        </p:txBody>
+      </p:sp>
+      <p:sp>
+        <p:nvSpPr>
+          <p:cNvPr id="79" name="TextBox 78"/>
+          <p:cNvSpPr txBox="1"/>
+          <p:nvPr/>
+        </p:nvSpPr>
+        <p:spPr>
+          <a:xfrm>
+            <a:off x="5888773" y="4325966"/>
+            <a:ext cx="1198280" cy="369332"/>
+          </a:xfrm>
+          <a:prstGeom prst="rect">
+            <a:avLst/>
+          </a:prstGeom>
+          <a:noFill/>
+        </p:spPr>
+        <p:txBody>
+          <a:bodyPr wrap="square" lIns="0" tIns="0" rIns="0" bIns="0" rtlCol="0">
+            <a:spAutoFit/>
+          </a:bodyPr>
+          <a:lstStyle/>
+          <a:p>
+            <a:pPr algn="ctr"/>
+            <a:r>
+              <a:rPr lang="da-DK" sz="2400" dirty="0">
+                <a:latin typeface="Arial" panose="020B0604020202020204" pitchFamily="34" charset="0"/>
+                <a:ea typeface="Open Sans" panose="020B0606030504020204" pitchFamily="34" charset="0"/>
+                <a:cs typeface="Arial" panose="020B0604020202020204" pitchFamily="34" charset="0"/>
+              </a:rPr>
+              <a:t>patch</a:t>
+            </a:r>
+          </a:p>
+        </p:txBody>
+      </p:sp>
+      <p:sp>
+        <p:nvSpPr>
+          <p:cNvPr id="80" name="Rectangle 79"/>
+          <p:cNvSpPr/>
+          <p:nvPr/>
+        </p:nvSpPr>
+        <p:spPr>
+          <a:xfrm>
+            <a:off x="4522810" y="5085184"/>
+            <a:ext cx="2880945" cy="1152128"/>
+          </a:xfrm>
+          <a:prstGeom prst="rect">
+            <a:avLst/>
+          </a:prstGeom>
+          <a:solidFill>
+            <a:schemeClr val="tx1"/>
+          </a:solidFill>
+          <a:ln w="9525">
+            <a:noFill/>
+            <a:prstDash val="dash"/>
+          </a:ln>
+        </p:spPr>
+        <p:style>
+          <a:lnRef idx="2">
+            <a:schemeClr val="accent1">
+              <a:shade val="50000"/>
+            </a:schemeClr>
+          </a:lnRef>
+          <a:fillRef idx="1">
+            <a:schemeClr val="accent1"/>
+          </a:fillRef>
+          <a:effectRef idx="0">
+            <a:schemeClr val="accent1"/>
+          </a:effectRef>
+          <a:fontRef idx="minor">
+            <a:schemeClr val="lt1"/>
+          </a:fontRef>
+        </p:style>
+        <p:txBody>
+          <a:bodyPr rtlCol="0" anchor="ctr"/>
+          <a:lstStyle/>
+          <a:p>
+            <a:pPr algn="ctr"/>
+            <a:r>
+              <a:rPr lang="da-DK" sz="2400" dirty="0">
+                <a:solidFill>
+                  <a:schemeClr val="bg1"/>
+                </a:solidFill>
+                <a:latin typeface="Arial" panose="020B0604020202020204" pitchFamily="34" charset="0"/>
+                <a:cs typeface="Arial" panose="020B0604020202020204" pitchFamily="34" charset="0"/>
+              </a:rPr>
+              <a:t>DOM</a:t>
+            </a:r>
+          </a:p>
+        </p:txBody>
+      </p:sp>
+    </p:spTree>
+    <p:extLst>
+      <p:ext uri="{BB962C8B-B14F-4D97-AF65-F5344CB8AC3E}">
+        <p14:creationId xmlns:p14="http://schemas.microsoft.com/office/powerpoint/2010/main" val="2323718161"/>
       </p:ext>
     </p:extLst>
   </p:cSld>

</xml_diff>

<commit_message>
Added Typescript code in demo. Adjusted presentation.
</commit_message>
<xml_diff>
--- a/20170331-microsoft-60min/_notes/Presentation.pptx
+++ b/20170331-microsoft-60min/_notes/Presentation.pptx
@@ -131,7 +131,7 @@
   </p:defaultTextStyle>
   <p:extLst>
     <p:ext uri="{EFAFB233-063F-42B5-8137-9DF3F51BA10A}">
-      <p15:sldGuideLst xmlns:p15="http://schemas.microsoft.com/office/powerpoint/2012/main">
+      <p15:sldGuideLst xmlns:p15="http://schemas.microsoft.com/office/powerpoint/2012/main" xmlns="">
         <p15:guide id="1" orient="horz" pos="2160">
           <p15:clr>
             <a:srgbClr val="A4A3A4"/>
@@ -235,7 +235,7 @@
                 <a:latin typeface="Arial" panose="020B0604020202020204" pitchFamily="34" charset="0"/>
               </a:rPr>
               <a:pPr/>
-              <a:t>3/28/2017</a:t>
+              <a:t>3/29/2017</a:t>
             </a:fld>
             <a:endParaRPr lang="en-US" dirty="0">
               <a:latin typeface="Arial" panose="020B0604020202020204" pitchFamily="34" charset="0"/>
@@ -414,7 +414,7 @@
             <a:fld id="{24063557-F382-450A-AFD2-DBDF34A23BF0}" type="datetimeFigureOut">
               <a:rPr lang="en-US"/>
               <a:pPr/>
-              <a:t>3/28/2017</a:t>
+              <a:t>3/29/2017</a:t>
             </a:fld>
             <a:endParaRPr lang="en-US" dirty="0"/>
           </a:p>
@@ -923,7 +923,7 @@
           <a:p>
             <a:fld id="{7A57692F-3CBA-4355-8A55-3D1B2312D0DE}" type="datetime1">
               <a:rPr lang="en-GB" smtClean="0"/>
-              <a:t>28/03/2017</a:t>
+              <a:t>29/03/2017</a:t>
             </a:fld>
             <a:endParaRPr lang="en-US" dirty="0"/>
           </a:p>
@@ -1203,7 +1203,7 @@
           <a:p>
             <a:fld id="{B4A1A81C-3A2B-4225-BBCB-B5EEA77564DE}" type="datetime1">
               <a:rPr lang="en-GB" smtClean="0"/>
-              <a:t>28/03/2017</a:t>
+              <a:t>29/03/2017</a:t>
             </a:fld>
             <a:endParaRPr lang="en-US" dirty="0"/>
           </a:p>
@@ -1314,7 +1314,7 @@
           <a:p>
             <a:fld id="{1C778B45-47DF-45E1-89C8-21A4AAE5193A}" type="datetime1">
               <a:rPr lang="en-GB" smtClean="0"/>
-              <a:t>28/03/2017</a:t>
+              <a:t>29/03/2017</a:t>
             </a:fld>
             <a:endParaRPr lang="en-US" dirty="0"/>
           </a:p>
@@ -1457,7 +1457,7 @@
           <a:p>
             <a:fld id="{B28390F5-47C7-4B4F-B500-E9F9053405DD}" type="datetime1">
               <a:rPr lang="en-GB" smtClean="0"/>
-              <a:t>28/03/2017</a:t>
+              <a:t>29/03/2017</a:t>
             </a:fld>
             <a:endParaRPr lang="en-US" dirty="0"/>
           </a:p>
@@ -1687,7 +1687,7 @@
           <a:p>
             <a:fld id="{EAA636A3-88D2-4DAD-BA2B-1456EFB0EA1A}" type="datetime1">
               <a:rPr lang="en-GB" smtClean="0"/>
-              <a:t>28/03/2017</a:t>
+              <a:t>29/03/2017</a:t>
             </a:fld>
             <a:endParaRPr lang="en-GB"/>
           </a:p>
@@ -1830,7 +1830,7 @@
           <a:p>
             <a:fld id="{07BD2638-165F-459F-9AC9-17734AB1218F}" type="datetime1">
               <a:rPr lang="en-GB" smtClean="0"/>
-              <a:t>28/03/2017</a:t>
+              <a:t>29/03/2017</a:t>
             </a:fld>
             <a:endParaRPr lang="en-GB"/>
           </a:p>
@@ -2131,7 +2131,7 @@
           <a:p>
             <a:fld id="{2DA4D049-087C-4FCD-8FBA-8677853A664C}" type="datetime1">
               <a:rPr lang="en-GB" smtClean="0"/>
-              <a:t>28/03/2017</a:t>
+              <a:t>29/03/2017</a:t>
             </a:fld>
             <a:endParaRPr lang="da-DK" dirty="0"/>
           </a:p>
@@ -2244,7 +2244,7 @@
           <a:graphicData uri="http://schemas.openxmlformats.org/presentationml/2006/ole">
             <mc:AlternateContent xmlns:mc="http://schemas.openxmlformats.org/markup-compatibility/2006">
               <mc:Choice xmlns:v="urn:schemas-microsoft-com:vml" Requires="v">
-                <p:oleObj spid="_x0000_s1455" name="think-cell Slide" r:id="rId11" imgW="473" imgH="473" progId="TCLayout.ActiveDocument.1">
+                <p:oleObj spid="_x0000_s1459" name="think-cell Slide" r:id="rId11" imgW="473" imgH="473" progId="TCLayout.ActiveDocument.1">
                   <p:embed/>
                 </p:oleObj>
               </mc:Choice>
@@ -2593,7 +2593,7 @@
           <a:p>
             <a:fld id="{460F4891-E81A-49DA-A060-8B93BF9F824E}" type="datetime1">
               <a:rPr lang="en-GB" smtClean="0"/>
-              <a:t>28/03/2017</a:t>
+              <a:t>29/03/2017</a:t>
             </a:fld>
             <a:endParaRPr lang="da-DK"/>
           </a:p>
@@ -2869,7 +2869,7 @@
   </p:txStyles>
   <p:extLst mod="1">
     <p:ext uri="{27BBF7A9-308A-43DC-89C8-2F10F3537804}">
-      <p15:sldGuideLst xmlns:p15="http://schemas.microsoft.com/office/powerpoint/2012/main">
+      <p15:sldGuideLst xmlns:p15="http://schemas.microsoft.com/office/powerpoint/2012/main" xmlns="">
         <p15:guide id="1" pos="384" userDrawn="1">
           <p15:clr>
             <a:srgbClr val="F26B43"/>
@@ -4218,6 +4218,14 @@
   <p:clrMapOvr>
     <a:masterClrMapping/>
   </p:clrMapOvr>
+  <mc:AlternateContent xmlns:mc="http://schemas.openxmlformats.org/markup-compatibility/2006">
+    <mc:Choice xmlns:p14="http://schemas.microsoft.com/office/powerpoint/2010/main" Requires="p14">
+      <p:transition spd="slow" p14:dur="2000"/>
+    </mc:Choice>
+    <mc:Fallback>
+      <p:transition spd="slow"/>
+    </mc:Fallback>
+  </mc:AlternateContent>
 </p:sld>
 </file>
 
@@ -4403,6 +4411,14 @@
   <p:clrMapOvr>
     <a:masterClrMapping/>
   </p:clrMapOvr>
+  <mc:AlternateContent xmlns:mc="http://schemas.openxmlformats.org/markup-compatibility/2006">
+    <mc:Choice xmlns:p14="http://schemas.microsoft.com/office/powerpoint/2010/main" Requires="p14">
+      <p:transition spd="slow" p14:dur="2000"/>
+    </mc:Choice>
+    <mc:Fallback>
+      <p:transition spd="slow"/>
+    </mc:Fallback>
+  </mc:AlternateContent>
 </p:sld>
 </file>
 
@@ -4957,6 +4973,14 @@
   <p:clrMapOvr>
     <a:masterClrMapping/>
   </p:clrMapOvr>
+  <mc:AlternateContent xmlns:mc="http://schemas.openxmlformats.org/markup-compatibility/2006">
+    <mc:Choice xmlns:p14="http://schemas.microsoft.com/office/powerpoint/2010/main" Requires="p14">
+      <p:transition spd="slow" p14:dur="2000"/>
+    </mc:Choice>
+    <mc:Fallback>
+      <p:transition spd="slow"/>
+    </mc:Fallback>
+  </mc:AlternateContent>
 </p:sld>
 </file>
 
@@ -5221,6 +5245,14 @@
   <p:clrMapOvr>
     <a:masterClrMapping/>
   </p:clrMapOvr>
+  <mc:AlternateContent xmlns:mc="http://schemas.openxmlformats.org/markup-compatibility/2006">
+    <mc:Choice xmlns:p14="http://schemas.microsoft.com/office/powerpoint/2010/main" Requires="p14">
+      <p:transition spd="slow" p14:dur="2000"/>
+    </mc:Choice>
+    <mc:Fallback>
+      <p:transition spd="slow"/>
+    </mc:Fallback>
+  </mc:AlternateContent>
 </p:sld>
 </file>
 
@@ -5507,6 +5539,14 @@
   <p:clrMapOvr>
     <a:masterClrMapping/>
   </p:clrMapOvr>
+  <mc:AlternateContent xmlns:mc="http://schemas.openxmlformats.org/markup-compatibility/2006">
+    <mc:Choice xmlns:p14="http://schemas.microsoft.com/office/powerpoint/2010/main" Requires="p14">
+      <p:transition spd="slow" p14:dur="2000"/>
+    </mc:Choice>
+    <mc:Fallback>
+      <p:transition spd="slow"/>
+    </mc:Fallback>
+  </mc:AlternateContent>
 </p:sld>
 </file>
 
@@ -6374,6 +6414,14 @@
   <p:clrMapOvr>
     <a:masterClrMapping/>
   </p:clrMapOvr>
+  <mc:AlternateContent xmlns:mc="http://schemas.openxmlformats.org/markup-compatibility/2006">
+    <mc:Choice xmlns:p14="http://schemas.microsoft.com/office/powerpoint/2010/main" Requires="p14">
+      <p:transition spd="slow" p14:dur="2000"/>
+    </mc:Choice>
+    <mc:Fallback>
+      <p:transition spd="slow"/>
+    </mc:Fallback>
+  </mc:AlternateContent>
 </p:sld>
 </file>
 
@@ -6445,28 +6493,28 @@
                 <a:gridCol w="2743200">
                   <a:extLst>
                     <a:ext uri="{9D8B030D-6E8A-4147-A177-3AD203B41FA5}">
-                      <a16:colId xmlns:a16="http://schemas.microsoft.com/office/drawing/2014/main" val="20000"/>
+                      <a16:colId xmlns:a16="http://schemas.microsoft.com/office/drawing/2014/main" xmlns="" val="20000"/>
                     </a:ext>
                   </a:extLst>
                 </a:gridCol>
                 <a:gridCol w="2743200">
                   <a:extLst>
                     <a:ext uri="{9D8B030D-6E8A-4147-A177-3AD203B41FA5}">
-                      <a16:colId xmlns:a16="http://schemas.microsoft.com/office/drawing/2014/main" val="20001"/>
+                      <a16:colId xmlns:a16="http://schemas.microsoft.com/office/drawing/2014/main" xmlns="" val="20001"/>
                     </a:ext>
                   </a:extLst>
                 </a:gridCol>
                 <a:gridCol w="2743200">
                   <a:extLst>
                     <a:ext uri="{9D8B030D-6E8A-4147-A177-3AD203B41FA5}">
-                      <a16:colId xmlns:a16="http://schemas.microsoft.com/office/drawing/2014/main" val="20002"/>
+                      <a16:colId xmlns:a16="http://schemas.microsoft.com/office/drawing/2014/main" xmlns="" val="20002"/>
                     </a:ext>
                   </a:extLst>
                 </a:gridCol>
                 <a:gridCol w="2743200">
                   <a:extLst>
                     <a:ext uri="{9D8B030D-6E8A-4147-A177-3AD203B41FA5}">
-                      <a16:colId xmlns:a16="http://schemas.microsoft.com/office/drawing/2014/main" val="20003"/>
+                      <a16:colId xmlns:a16="http://schemas.microsoft.com/office/drawing/2014/main" xmlns="" val="20003"/>
                     </a:ext>
                   </a:extLst>
                 </a:gridCol>
@@ -6531,7 +6579,7 @@
                 </a:tc>
                 <a:extLst>
                   <a:ext uri="{0D108BD9-81ED-4DB2-BD59-A6C34878D82A}">
-                    <a16:rowId xmlns:a16="http://schemas.microsoft.com/office/drawing/2014/main" val="10000"/>
+                    <a16:rowId xmlns:a16="http://schemas.microsoft.com/office/drawing/2014/main" xmlns="" val="10000"/>
                   </a:ext>
                 </a:extLst>
               </a:tr>
@@ -6593,7 +6641,7 @@
                 </a:tc>
                 <a:extLst>
                   <a:ext uri="{0D108BD9-81ED-4DB2-BD59-A6C34878D82A}">
-                    <a16:rowId xmlns:a16="http://schemas.microsoft.com/office/drawing/2014/main" val="10001"/>
+                    <a16:rowId xmlns:a16="http://schemas.microsoft.com/office/drawing/2014/main" xmlns="" val="10001"/>
                   </a:ext>
                 </a:extLst>
               </a:tr>
@@ -6655,7 +6703,7 @@
                 </a:tc>
                 <a:extLst>
                   <a:ext uri="{0D108BD9-81ED-4DB2-BD59-A6C34878D82A}">
-                    <a16:rowId xmlns:a16="http://schemas.microsoft.com/office/drawing/2014/main" val="10002"/>
+                    <a16:rowId xmlns:a16="http://schemas.microsoft.com/office/drawing/2014/main" xmlns="" val="10002"/>
                   </a:ext>
                 </a:extLst>
               </a:tr>
@@ -6717,7 +6765,7 @@
                 </a:tc>
                 <a:extLst>
                   <a:ext uri="{0D108BD9-81ED-4DB2-BD59-A6C34878D82A}">
-                    <a16:rowId xmlns:a16="http://schemas.microsoft.com/office/drawing/2014/main" val="10003"/>
+                    <a16:rowId xmlns:a16="http://schemas.microsoft.com/office/drawing/2014/main" xmlns="" val="10003"/>
                   </a:ext>
                 </a:extLst>
               </a:tr>
@@ -6784,7 +6832,7 @@
                 </a:tc>
                 <a:extLst>
                   <a:ext uri="{0D108BD9-81ED-4DB2-BD59-A6C34878D82A}">
-                    <a16:rowId xmlns:a16="http://schemas.microsoft.com/office/drawing/2014/main" val="10004"/>
+                    <a16:rowId xmlns:a16="http://schemas.microsoft.com/office/drawing/2014/main" xmlns="" val="10004"/>
                   </a:ext>
                 </a:extLst>
               </a:tr>
@@ -6846,7 +6894,7 @@
                 </a:tc>
                 <a:extLst>
                   <a:ext uri="{0D108BD9-81ED-4DB2-BD59-A6C34878D82A}">
-                    <a16:rowId xmlns:a16="http://schemas.microsoft.com/office/drawing/2014/main" val="10005"/>
+                    <a16:rowId xmlns:a16="http://schemas.microsoft.com/office/drawing/2014/main" xmlns="" val="10005"/>
                   </a:ext>
                 </a:extLst>
               </a:tr>
@@ -6888,6 +6936,14 @@
   <p:clrMapOvr>
     <a:masterClrMapping/>
   </p:clrMapOvr>
+  <mc:AlternateContent xmlns:mc="http://schemas.openxmlformats.org/markup-compatibility/2006">
+    <mc:Choice xmlns:p14="http://schemas.microsoft.com/office/powerpoint/2010/main" Requires="p14">
+      <p:transition spd="slow" p14:dur="2000"/>
+    </mc:Choice>
+    <mc:Fallback>
+      <p:transition spd="slow"/>
+    </mc:Fallback>
+  </mc:AlternateContent>
 </p:sld>
 </file>
 
@@ -7133,6 +7189,14 @@
   <p:clrMapOvr>
     <a:masterClrMapping/>
   </p:clrMapOvr>
+  <mc:AlternateContent xmlns:mc="http://schemas.openxmlformats.org/markup-compatibility/2006">
+    <mc:Choice xmlns:p14="http://schemas.microsoft.com/office/powerpoint/2010/main" Requires="p14">
+      <p:transition spd="slow" p14:dur="2000"/>
+    </mc:Choice>
+    <mc:Fallback>
+      <p:transition spd="slow"/>
+    </mc:Fallback>
+  </mc:AlternateContent>
 </p:sld>
 </file>
 
@@ -7311,7 +7375,7 @@
           <p:nvPr/>
         </p:nvSpPr>
         <p:spPr>
-          <a:xfrm rot="2641912">
+          <a:xfrm rot="3146799">
             <a:off x="7605551" y="1738241"/>
             <a:ext cx="2070095" cy="3315911"/>
           </a:xfrm>
@@ -7996,14 +8060,18 @@
             <a:pPr lvl="1"/>
             <a:r>
               <a:rPr lang="da-DK" dirty="0"/>
-              <a:t>What we wish we had known when we started</a:t>
+              <a:t>Look at each technology in isolation</a:t>
             </a:r>
           </a:p>
           <a:p>
             <a:pPr lvl="1"/>
             <a:r>
+              <a:rPr lang="da-DK" dirty="0" smtClean="0"/>
+              <a:t>What </a:t>
+            </a:r>
+            <a:r>
               <a:rPr lang="da-DK" dirty="0"/>
-              <a:t>Look at each technology in isolation</a:t>
+              <a:t>we wish we had known when we started</a:t>
             </a:r>
           </a:p>
           <a:p>
@@ -8130,9 +8198,10 @@
           <a:p>
             <a:pPr lvl="1"/>
             <a:r>
-              <a:rPr lang="da-DK" dirty="0"/>
-              <a:t>Distribution</a:t>
-            </a:r>
+              <a:rPr lang="da-DK" dirty="0" smtClean="0"/>
+              <a:t>Distributing</a:t>
+            </a:r>
+            <a:endParaRPr lang="da-DK" dirty="0"/>
           </a:p>
           <a:p>
             <a:pPr lvl="1"/>
@@ -8144,9 +8213,10 @@
           <a:p>
             <a:pPr lvl="1"/>
             <a:r>
-              <a:rPr lang="da-DK" dirty="0"/>
-              <a:t>Integration</a:t>
-            </a:r>
+              <a:rPr lang="da-DK" dirty="0" smtClean="0"/>
+              <a:t>Integrating</a:t>
+            </a:r>
+            <a:endParaRPr lang="da-DK" dirty="0"/>
           </a:p>
           <a:p>
             <a:endParaRPr lang="da-DK" dirty="0"/>
@@ -8182,22 +8252,18 @@
             <a:pPr lvl="2"/>
             <a:r>
               <a:rPr lang="da-DK" dirty="0"/>
-              <a:t>Poland: 1 designer</a:t>
-            </a:r>
-          </a:p>
-          <a:p>
-            <a:pPr lvl="2"/>
-            <a:endParaRPr lang="da-DK" dirty="0"/>
-          </a:p>
-          <a:p>
-            <a:pPr lvl="2"/>
-            <a:endParaRPr lang="da-DK" dirty="0"/>
-          </a:p>
-          <a:p>
-            <a:endParaRPr lang="da-DK" dirty="0"/>
-          </a:p>
-          <a:p>
-            <a:endParaRPr lang="da-DK" dirty="0"/>
+              <a:t>Poland: 1 </a:t>
+            </a:r>
+            <a:r>
+              <a:rPr lang="da-DK" dirty="0" smtClean="0"/>
+              <a:t>designer</a:t>
+            </a:r>
+          </a:p>
+          <a:p>
+            <a:pPr marL="360000" lvl="2" indent="0">
+              <a:buNone/>
+            </a:pPr>
+            <a:endParaRPr lang="da-DK" dirty="0" smtClean="0"/>
           </a:p>
         </p:txBody>
       </p:sp>
@@ -9870,7 +9936,7 @@
   <a:extraClrSchemeLst/>
   <a:extLst>
     <a:ext uri="{05A4C25C-085E-4340-85A3-A5531E510DB2}">
-      <thm15:themeFamily xmlns:thm15="http://schemas.microsoft.com/office/thememl/2012/main" name="Blank" id="{830CEE72-04DE-49CD-A238-BC86AC75B159}" vid="{B4F07104-86D5-428B-8C12-2ECED95A2983}"/>
+      <thm15:themeFamily xmlns:thm15="http://schemas.microsoft.com/office/thememl/2012/main" xmlns="" name="Blank" id="{830CEE72-04DE-49CD-A238-BC86AC75B159}" vid="{B4F07104-86D5-428B-8C12-2ECED95A2983}"/>
     </a:ext>
   </a:extLst>
 </a:theme>
@@ -10131,7 +10197,7 @@
   <a:extraClrSchemeLst/>
   <a:extLst>
     <a:ext uri="{05A4C25C-085E-4340-85A3-A5531E510DB2}">
-      <thm15:themeFamily xmlns:thm15="http://schemas.microsoft.com/office/thememl/2012/main" name="Office Theme" id="{62F939B6-93AF-4DB8-9C6B-D6C7DFDC589F}" vid="{4A3C46E8-61CC-4603-A589-7422A47A8E4A}"/>
+      <thm15:themeFamily xmlns:thm15="http://schemas.microsoft.com/office/thememl/2012/main" xmlns="" name="Office Theme" id="{62F939B6-93AF-4DB8-9C6B-D6C7DFDC589F}" vid="{4A3C46E8-61CC-4603-A589-7422A47A8E4A}"/>
     </a:ext>
   </a:extLst>
 </a:theme>
@@ -10392,7 +10458,7 @@
   <a:extraClrSchemeLst/>
   <a:extLst>
     <a:ext uri="{05A4C25C-085E-4340-85A3-A5531E510DB2}">
-      <thm15:themeFamily xmlns:thm15="http://schemas.microsoft.com/office/thememl/2012/main" name="Office Theme" id="{62F939B6-93AF-4DB8-9C6B-D6C7DFDC589F}" vid="{4A3C46E8-61CC-4603-A589-7422A47A8E4A}"/>
+      <thm15:themeFamily xmlns:thm15="http://schemas.microsoft.com/office/thememl/2012/main" xmlns="" name="Office Theme" id="{62F939B6-93AF-4DB8-9C6B-D6C7DFDC589F}" vid="{4A3C46E8-61CC-4603-A589-7422A47A8E4A}"/>
     </a:ext>
   </a:extLst>
 </a:theme>

</xml_diff>